<commit_message>
Added letters to many cells to make columns clearer and added symbols to some visuals to make the rows clearer. Also created an `anti_join` visual
</commit_message>
<xml_diff>
--- a/images/tidyverse-visuals-dev.pptx
+++ b/images/tidyverse-visuals-dev.pptx
@@ -13,8 +13,9 @@
     <p:sldId id="265" r:id="rId7"/>
     <p:sldId id="258" r:id="rId8"/>
     <p:sldId id="263" r:id="rId9"/>
-    <p:sldId id="259" r:id="rId10"/>
-    <p:sldId id="262" r:id="rId11"/>
+    <p:sldId id="266" r:id="rId10"/>
+    <p:sldId id="259" r:id="rId11"/>
+    <p:sldId id="262" r:id="rId12"/>
   </p:sldIdLst>
   <p:sldSz cx="12192000" cy="6858000"/>
   <p:notesSz cx="6858000" cy="9144000"/>
@@ -113,6 +114,11 @@
       </a:defRPr>
     </a:lvl9pPr>
   </p:defaultTextStyle>
+  <p:extLst>
+    <p:ext uri="{EFAFB233-063F-42B5-8137-9DF3F51BA10A}">
+      <p15:sldGuideLst xmlns:p15="http://schemas.microsoft.com/office/powerpoint/2012/main"/>
+    </p:ext>
+  </p:extLst>
 </p:presentation>
 </file>
 
@@ -3384,7 +3390,10 @@
           <a:lstStyle/>
           <a:p>
             <a:pPr algn="ctr"/>
-            <a:endParaRPr lang="en-US"/>
+            <a:r>
+              <a:rPr lang="en-US" sz="4400" b="1" dirty="0"/>
+              <a:t>A</a:t>
+            </a:r>
           </a:p>
         </p:txBody>
       </p:sp>
@@ -3443,7 +3452,7 @@
           <a:lstStyle/>
           <a:p>
             <a:pPr algn="ctr"/>
-            <a:endParaRPr lang="en-US"/>
+            <a:endParaRPr lang="en-US" sz="4400" b="1"/>
           </a:p>
         </p:txBody>
       </p:sp>
@@ -3499,7 +3508,10 @@
           <a:lstStyle/>
           <a:p>
             <a:pPr algn="ctr"/>
-            <a:endParaRPr lang="en-US"/>
+            <a:r>
+              <a:rPr lang="en-US" sz="4400" b="1" dirty="0"/>
+              <a:t>B</a:t>
+            </a:r>
           </a:p>
         </p:txBody>
       </p:sp>
@@ -3558,7 +3570,7 @@
           <a:lstStyle/>
           <a:p>
             <a:pPr algn="ctr"/>
-            <a:endParaRPr lang="en-US"/>
+            <a:endParaRPr lang="en-US" sz="4400" b="1"/>
           </a:p>
         </p:txBody>
       </p:sp>
@@ -3616,7 +3628,10 @@
           <a:lstStyle/>
           <a:p>
             <a:pPr algn="ctr"/>
-            <a:endParaRPr lang="en-US"/>
+            <a:r>
+              <a:rPr lang="en-US" sz="4400" b="1" dirty="0"/>
+              <a:t>C</a:t>
+            </a:r>
           </a:p>
         </p:txBody>
       </p:sp>
@@ -3675,7 +3690,7 @@
           <a:lstStyle/>
           <a:p>
             <a:pPr algn="ctr"/>
-            <a:endParaRPr lang="en-US"/>
+            <a:endParaRPr lang="en-US" sz="4400" b="1"/>
           </a:p>
         </p:txBody>
       </p:sp>
@@ -3849,7 +3864,10 @@
           <a:lstStyle/>
           <a:p>
             <a:pPr algn="ctr"/>
-            <a:endParaRPr lang="en-US"/>
+            <a:r>
+              <a:rPr lang="en-US" sz="4400" b="1" dirty="0"/>
+              <a:t>A</a:t>
+            </a:r>
           </a:p>
         </p:txBody>
       </p:sp>
@@ -3908,7 +3926,7 @@
           <a:lstStyle/>
           <a:p>
             <a:pPr algn="ctr"/>
-            <a:endParaRPr lang="en-US"/>
+            <a:endParaRPr lang="en-US" sz="4400" b="1"/>
           </a:p>
         </p:txBody>
       </p:sp>
@@ -3944,10 +3962,10 @@
       </p:grpSpPr>
       <p:sp>
         <p:nvSpPr>
-          <p:cNvPr id="7" name="Rectangle 6">
-            <a:extLst>
-              <a:ext uri="{FF2B5EF4-FFF2-40B4-BE49-F238E27FC236}">
-                <a16:creationId xmlns:a16="http://schemas.microsoft.com/office/drawing/2014/main" id="{1BE21053-4CD6-953A-7B7D-048B4AD0D53A}"/>
+          <p:cNvPr id="5" name="Rectangle 4">
+            <a:extLst>
+              <a:ext uri="{FF2B5EF4-FFF2-40B4-BE49-F238E27FC236}">
+                <a16:creationId xmlns:a16="http://schemas.microsoft.com/office/drawing/2014/main" id="{01F4FA83-0791-ABF4-2495-25FB6E73359D}"/>
               </a:ext>
             </a:extLst>
           </p:cNvPr>
@@ -3958,8 +3976,8 @@
         </p:nvSpPr>
         <p:spPr>
           <a:xfrm>
-            <a:off x="3426460" y="2550552"/>
-            <a:ext cx="914400" cy="914400"/>
+            <a:off x="-1" y="0"/>
+            <a:ext cx="4733366" cy="914400"/>
           </a:xfrm>
           <a:prstGeom prst="rect">
             <a:avLst/>
@@ -3994,41 +4012,42 @@
           <a:lstStyle/>
           <a:p>
             <a:pPr algn="ctr"/>
-            <a:endParaRPr lang="en-US"/>
-          </a:p>
-        </p:txBody>
-      </p:sp>
-      <p:sp>
-        <p:nvSpPr>
-          <p:cNvPr id="16" name="Rectangle 15">
-            <a:extLst>
-              <a:ext uri="{FF2B5EF4-FFF2-40B4-BE49-F238E27FC236}">
-                <a16:creationId xmlns:a16="http://schemas.microsoft.com/office/drawing/2014/main" id="{3EC4D57C-0440-BF33-11A6-840A3DED1E90}"/>
-              </a:ext>
-            </a:extLst>
-          </p:cNvPr>
-          <p:cNvSpPr>
-            <a:spLocks noChangeAspect="1"/>
-          </p:cNvSpPr>
-          <p:nvPr/>
-        </p:nvSpPr>
-        <p:spPr>
-          <a:xfrm>
-            <a:off x="4336677" y="2550552"/>
-            <a:ext cx="914400" cy="914400"/>
-          </a:xfrm>
-          <a:prstGeom prst="rect">
+            <a:r>
+              <a:rPr lang="en-US" sz="3200" b="1" dirty="0"/>
+              <a:t>Reshaping: Pivot Longer </a:t>
+            </a:r>
+          </a:p>
+        </p:txBody>
+      </p:sp>
+      <p:sp>
+        <p:nvSpPr>
+          <p:cNvPr id="6" name="Right Arrow 5">
+            <a:extLst>
+              <a:ext uri="{FF2B5EF4-FFF2-40B4-BE49-F238E27FC236}">
+                <a16:creationId xmlns:a16="http://schemas.microsoft.com/office/drawing/2014/main" id="{2E2BA415-57C2-4ABA-2DF2-70857FFA5565}"/>
+              </a:ext>
+            </a:extLst>
+          </p:cNvPr>
+          <p:cNvSpPr/>
+          <p:nvPr/>
+        </p:nvSpPr>
+        <p:spPr>
+          <a:xfrm>
+            <a:off x="5548553" y="3364097"/>
+            <a:ext cx="914400" cy="524435"/>
+          </a:xfrm>
+          <a:prstGeom prst="rightArrow">
             <a:avLst/>
           </a:prstGeom>
           <a:solidFill>
-            <a:schemeClr val="accent4">
-              <a:lumMod val="60000"/>
-              <a:lumOff val="40000"/>
+            <a:schemeClr val="tx2">
+              <a:lumMod val="40000"/>
+              <a:lumOff val="60000"/>
             </a:schemeClr>
           </a:solidFill>
           <a:ln w="28575">
             <a:solidFill>
-              <a:schemeClr val="bg1"/>
+              <a:schemeClr val="tx2"/>
             </a:solidFill>
           </a:ln>
         </p:spPr>
@@ -4059,10 +4078,10 @@
       </p:sp>
       <p:sp>
         <p:nvSpPr>
-          <p:cNvPr id="17" name="Rectangle 16">
-            <a:extLst>
-              <a:ext uri="{FF2B5EF4-FFF2-40B4-BE49-F238E27FC236}">
-                <a16:creationId xmlns:a16="http://schemas.microsoft.com/office/drawing/2014/main" id="{7F4CF8F8-4023-9F8A-D4A3-5E4399790904}"/>
+          <p:cNvPr id="7" name="Rectangle 6">
+            <a:extLst>
+              <a:ext uri="{FF2B5EF4-FFF2-40B4-BE49-F238E27FC236}">
+                <a16:creationId xmlns:a16="http://schemas.microsoft.com/office/drawing/2014/main" id="{1BE21053-4CD6-953A-7B7D-048B4AD0D53A}"/>
               </a:ext>
             </a:extLst>
           </p:cNvPr>
@@ -4073,16 +4092,14 @@
         </p:nvSpPr>
         <p:spPr>
           <a:xfrm>
-            <a:off x="3426460" y="4379352"/>
+            <a:off x="6850376" y="2254715"/>
             <a:ext cx="914400" cy="914400"/>
           </a:xfrm>
           <a:prstGeom prst="rect">
             <a:avLst/>
           </a:prstGeom>
           <a:solidFill>
-            <a:schemeClr val="accent4">
-              <a:lumMod val="50000"/>
-            </a:schemeClr>
+            <a:schemeClr val="accent4"/>
           </a:solidFill>
           <a:ln w="28575">
             <a:solidFill>
@@ -4111,16 +4128,19 @@
           <a:lstStyle/>
           <a:p>
             <a:pPr algn="ctr"/>
-            <a:endParaRPr lang="en-US"/>
-          </a:p>
-        </p:txBody>
-      </p:sp>
-      <p:sp>
-        <p:nvSpPr>
-          <p:cNvPr id="18" name="Rectangle 17">
-            <a:extLst>
-              <a:ext uri="{FF2B5EF4-FFF2-40B4-BE49-F238E27FC236}">
-                <a16:creationId xmlns:a16="http://schemas.microsoft.com/office/drawing/2014/main" id="{7923B18E-31C4-6DB5-13A7-161463AA7A90}"/>
+            <a:r>
+              <a:rPr lang="en-US" sz="4400" b="1" dirty="0"/>
+              <a:t>C</a:t>
+            </a:r>
+          </a:p>
+        </p:txBody>
+      </p:sp>
+      <p:sp>
+        <p:nvSpPr>
+          <p:cNvPr id="9" name="Rectangle 8">
+            <a:extLst>
+              <a:ext uri="{FF2B5EF4-FFF2-40B4-BE49-F238E27FC236}">
+                <a16:creationId xmlns:a16="http://schemas.microsoft.com/office/drawing/2014/main" id="{B25364AF-F4B4-A6BB-CA44-15A4671FFC87}"/>
               </a:ext>
             </a:extLst>
           </p:cNvPr>
@@ -4131,7 +4151,7 @@
         </p:nvSpPr>
         <p:spPr>
           <a:xfrm>
-            <a:off x="3426460" y="3464952"/>
+            <a:off x="4246730" y="2711915"/>
             <a:ext cx="914400" cy="914400"/>
           </a:xfrm>
           <a:prstGeom prst="rect">
@@ -4139,7 +4159,7 @@
           </a:prstGeom>
           <a:solidFill>
             <a:schemeClr val="accent4">
-              <a:lumMod val="75000"/>
+              <a:lumMod val="50000"/>
             </a:schemeClr>
           </a:solidFill>
           <a:ln w="28575">
@@ -4169,16 +4189,19 @@
           <a:lstStyle/>
           <a:p>
             <a:pPr algn="ctr"/>
-            <a:endParaRPr lang="en-US"/>
-          </a:p>
-        </p:txBody>
-      </p:sp>
-      <p:sp>
-        <p:nvSpPr>
-          <p:cNvPr id="22" name="Rectangle 21">
-            <a:extLst>
-              <a:ext uri="{FF2B5EF4-FFF2-40B4-BE49-F238E27FC236}">
-                <a16:creationId xmlns:a16="http://schemas.microsoft.com/office/drawing/2014/main" id="{B720A16E-E31F-3356-92EE-02BD8CD9C98A}"/>
+            <a:r>
+              <a:rPr lang="en-US" sz="4400" b="1" dirty="0"/>
+              <a:t>B</a:t>
+            </a:r>
+          </a:p>
+        </p:txBody>
+      </p:sp>
+      <p:sp>
+        <p:nvSpPr>
+          <p:cNvPr id="10" name="Rectangle 9">
+            <a:extLst>
+              <a:ext uri="{FF2B5EF4-FFF2-40B4-BE49-F238E27FC236}">
+                <a16:creationId xmlns:a16="http://schemas.microsoft.com/office/drawing/2014/main" id="{9685F398-8909-B531-2109-22EBC59413B5}"/>
               </a:ext>
             </a:extLst>
           </p:cNvPr>
@@ -4189,7 +4212,7 @@
         </p:nvSpPr>
         <p:spPr>
           <a:xfrm>
-            <a:off x="4336677" y="4379352"/>
+            <a:off x="4246730" y="3626315"/>
             <a:ext cx="914400" cy="914400"/>
           </a:xfrm>
           <a:prstGeom prst="rect">
@@ -4228,16 +4251,16 @@
           <a:lstStyle/>
           <a:p>
             <a:pPr algn="ctr"/>
-            <a:endParaRPr lang="en-US"/>
-          </a:p>
-        </p:txBody>
-      </p:sp>
-      <p:sp>
-        <p:nvSpPr>
-          <p:cNvPr id="23" name="Rectangle 22">
-            <a:extLst>
-              <a:ext uri="{FF2B5EF4-FFF2-40B4-BE49-F238E27FC236}">
-                <a16:creationId xmlns:a16="http://schemas.microsoft.com/office/drawing/2014/main" id="{58E7B698-D733-6E52-69C0-ED50B8383920}"/>
+            <a:endParaRPr lang="en-US" sz="4400" b="1"/>
+          </a:p>
+        </p:txBody>
+      </p:sp>
+      <p:sp>
+        <p:nvSpPr>
+          <p:cNvPr id="11" name="Rectangle 10">
+            <a:extLst>
+              <a:ext uri="{FF2B5EF4-FFF2-40B4-BE49-F238E27FC236}">
+                <a16:creationId xmlns:a16="http://schemas.microsoft.com/office/drawing/2014/main" id="{AEE4741C-8ECE-8AA6-1084-01054448B958}"/>
               </a:ext>
             </a:extLst>
           </p:cNvPr>
@@ -4248,7 +4271,7 @@
         </p:nvSpPr>
         <p:spPr>
           <a:xfrm>
-            <a:off x="4336677" y="3464952"/>
+            <a:off x="3332330" y="2711915"/>
             <a:ext cx="914400" cy="914400"/>
           </a:xfrm>
           <a:prstGeom prst="rect">
@@ -4256,8 +4279,7 @@
           </a:prstGeom>
           <a:solidFill>
             <a:schemeClr val="accent4">
-              <a:lumMod val="40000"/>
-              <a:lumOff val="60000"/>
+              <a:lumMod val="75000"/>
             </a:schemeClr>
           </a:solidFill>
           <a:ln w="28575">
@@ -4287,16 +4309,19 @@
           <a:lstStyle/>
           <a:p>
             <a:pPr algn="ctr"/>
-            <a:endParaRPr lang="en-US"/>
-          </a:p>
-        </p:txBody>
-      </p:sp>
-      <p:sp>
-        <p:nvSpPr>
-          <p:cNvPr id="5" name="Rectangle 4">
-            <a:extLst>
-              <a:ext uri="{FF2B5EF4-FFF2-40B4-BE49-F238E27FC236}">
-                <a16:creationId xmlns:a16="http://schemas.microsoft.com/office/drawing/2014/main" id="{01F4FA83-0791-ABF4-2495-25FB6E73359D}"/>
+            <a:r>
+              <a:rPr lang="en-US" sz="4400" b="1" dirty="0"/>
+              <a:t>A</a:t>
+            </a:r>
+          </a:p>
+        </p:txBody>
+      </p:sp>
+      <p:sp>
+        <p:nvSpPr>
+          <p:cNvPr id="12" name="Rectangle 11">
+            <a:extLst>
+              <a:ext uri="{FF2B5EF4-FFF2-40B4-BE49-F238E27FC236}">
+                <a16:creationId xmlns:a16="http://schemas.microsoft.com/office/drawing/2014/main" id="{BDE39744-B92C-486F-52A9-63B3C01D97A0}"/>
               </a:ext>
             </a:extLst>
           </p:cNvPr>
@@ -4307,14 +4332,17 @@
         </p:nvSpPr>
         <p:spPr>
           <a:xfrm>
-            <a:off x="-1" y="0"/>
-            <a:ext cx="4733366" cy="914400"/>
+            <a:off x="3332330" y="3626315"/>
+            <a:ext cx="914400" cy="914400"/>
           </a:xfrm>
           <a:prstGeom prst="rect">
             <a:avLst/>
           </a:prstGeom>
           <a:solidFill>
-            <a:schemeClr val="accent4"/>
+            <a:schemeClr val="accent4">
+              <a:lumMod val="40000"/>
+              <a:lumOff val="60000"/>
+            </a:schemeClr>
           </a:solidFill>
           <a:ln w="28575">
             <a:solidFill>
@@ -4343,42 +4371,41 @@
           <a:lstStyle/>
           <a:p>
             <a:pPr algn="ctr"/>
-            <a:r>
-              <a:rPr lang="en-US" sz="3200" b="1" dirty="0"/>
-              <a:t>Reshaping: Pivot Wider</a:t>
-            </a:r>
-          </a:p>
-        </p:txBody>
-      </p:sp>
-      <p:sp>
-        <p:nvSpPr>
-          <p:cNvPr id="6" name="Right Arrow 5">
-            <a:extLst>
-              <a:ext uri="{FF2B5EF4-FFF2-40B4-BE49-F238E27FC236}">
-                <a16:creationId xmlns:a16="http://schemas.microsoft.com/office/drawing/2014/main" id="{2E2BA415-57C2-4ABA-2DF2-70857FFA5565}"/>
-              </a:ext>
-            </a:extLst>
-          </p:cNvPr>
-          <p:cNvSpPr/>
-          <p:nvPr/>
-        </p:nvSpPr>
-        <p:spPr>
-          <a:xfrm>
-            <a:off x="5642683" y="3659934"/>
-            <a:ext cx="914400" cy="524435"/>
-          </a:xfrm>
-          <a:prstGeom prst="rightArrow">
+            <a:endParaRPr lang="en-US" sz="4400" b="1"/>
+          </a:p>
+        </p:txBody>
+      </p:sp>
+      <p:sp>
+        <p:nvSpPr>
+          <p:cNvPr id="16" name="Rectangle 15">
+            <a:extLst>
+              <a:ext uri="{FF2B5EF4-FFF2-40B4-BE49-F238E27FC236}">
+                <a16:creationId xmlns:a16="http://schemas.microsoft.com/office/drawing/2014/main" id="{3EC4D57C-0440-BF33-11A6-840A3DED1E90}"/>
+              </a:ext>
+            </a:extLst>
+          </p:cNvPr>
+          <p:cNvSpPr>
+            <a:spLocks noChangeAspect="1"/>
+          </p:cNvSpPr>
+          <p:nvPr/>
+        </p:nvSpPr>
+        <p:spPr>
+          <a:xfrm>
+            <a:off x="7760593" y="2254715"/>
+            <a:ext cx="914400" cy="914400"/>
+          </a:xfrm>
+          <a:prstGeom prst="rect">
             <a:avLst/>
           </a:prstGeom>
           <a:solidFill>
-            <a:schemeClr val="tx2">
-              <a:lumMod val="40000"/>
-              <a:lumOff val="60000"/>
+            <a:schemeClr val="accent4">
+              <a:lumMod val="60000"/>
+              <a:lumOff val="40000"/>
             </a:schemeClr>
           </a:solidFill>
           <a:ln w="28575">
             <a:solidFill>
-              <a:schemeClr val="tx2"/>
+              <a:schemeClr val="bg1"/>
             </a:solidFill>
           </a:ln>
         </p:spPr>
@@ -4403,16 +4430,19 @@
           <a:lstStyle/>
           <a:p>
             <a:pPr algn="ctr"/>
-            <a:endParaRPr lang="en-US"/>
-          </a:p>
-        </p:txBody>
-      </p:sp>
-      <p:sp>
-        <p:nvSpPr>
-          <p:cNvPr id="9" name="Rectangle 8">
-            <a:extLst>
-              <a:ext uri="{FF2B5EF4-FFF2-40B4-BE49-F238E27FC236}">
-                <a16:creationId xmlns:a16="http://schemas.microsoft.com/office/drawing/2014/main" id="{B25364AF-F4B4-A6BB-CA44-15A4671FFC87}"/>
+            <a:r>
+              <a:rPr lang="en-US" sz="4400" b="1" dirty="0"/>
+              <a:t>D</a:t>
+            </a:r>
+          </a:p>
+        </p:txBody>
+      </p:sp>
+      <p:sp>
+        <p:nvSpPr>
+          <p:cNvPr id="17" name="Rectangle 16">
+            <a:extLst>
+              <a:ext uri="{FF2B5EF4-FFF2-40B4-BE49-F238E27FC236}">
+                <a16:creationId xmlns:a16="http://schemas.microsoft.com/office/drawing/2014/main" id="{7F4CF8F8-4023-9F8A-D4A3-5E4399790904}"/>
               </a:ext>
             </a:extLst>
           </p:cNvPr>
@@ -4423,7 +4453,7 @@
         </p:nvSpPr>
         <p:spPr>
           <a:xfrm>
-            <a:off x="6952871" y="3007752"/>
+            <a:off x="6850376" y="4083515"/>
             <a:ext cx="914400" cy="914400"/>
           </a:xfrm>
           <a:prstGeom prst="rect">
@@ -4461,16 +4491,19 @@
           <a:lstStyle/>
           <a:p>
             <a:pPr algn="ctr"/>
-            <a:endParaRPr lang="en-US"/>
-          </a:p>
-        </p:txBody>
-      </p:sp>
-      <p:sp>
-        <p:nvSpPr>
-          <p:cNvPr id="10" name="Rectangle 9">
-            <a:extLst>
-              <a:ext uri="{FF2B5EF4-FFF2-40B4-BE49-F238E27FC236}">
-                <a16:creationId xmlns:a16="http://schemas.microsoft.com/office/drawing/2014/main" id="{9685F398-8909-B531-2109-22EBC59413B5}"/>
+            <a:r>
+              <a:rPr lang="en-US" sz="4400" b="1" dirty="0"/>
+              <a:t>B</a:t>
+            </a:r>
+          </a:p>
+        </p:txBody>
+      </p:sp>
+      <p:sp>
+        <p:nvSpPr>
+          <p:cNvPr id="18" name="Rectangle 17">
+            <a:extLst>
+              <a:ext uri="{FF2B5EF4-FFF2-40B4-BE49-F238E27FC236}">
+                <a16:creationId xmlns:a16="http://schemas.microsoft.com/office/drawing/2014/main" id="{7923B18E-31C4-6DB5-13A7-161463AA7A90}"/>
               </a:ext>
             </a:extLst>
           </p:cNvPr>
@@ -4481,7 +4514,7 @@
         </p:nvSpPr>
         <p:spPr>
           <a:xfrm>
-            <a:off x="6952871" y="3922152"/>
+            <a:off x="6850376" y="3169115"/>
             <a:ext cx="914400" cy="914400"/>
           </a:xfrm>
           <a:prstGeom prst="rect">
@@ -4489,8 +4522,7 @@
           </a:prstGeom>
           <a:solidFill>
             <a:schemeClr val="accent4">
-              <a:lumMod val="40000"/>
-              <a:lumOff val="60000"/>
+              <a:lumMod val="75000"/>
             </a:schemeClr>
           </a:solidFill>
           <a:ln w="28575">
@@ -4520,16 +4552,19 @@
           <a:lstStyle/>
           <a:p>
             <a:pPr algn="ctr"/>
-            <a:endParaRPr lang="en-US"/>
-          </a:p>
-        </p:txBody>
-      </p:sp>
-      <p:sp>
-        <p:nvSpPr>
-          <p:cNvPr id="11" name="Rectangle 10">
-            <a:extLst>
-              <a:ext uri="{FF2B5EF4-FFF2-40B4-BE49-F238E27FC236}">
-                <a16:creationId xmlns:a16="http://schemas.microsoft.com/office/drawing/2014/main" id="{AEE4741C-8ECE-8AA6-1084-01054448B958}"/>
+            <a:r>
+              <a:rPr lang="en-US" sz="4400" b="1" dirty="0"/>
+              <a:t>A</a:t>
+            </a:r>
+          </a:p>
+        </p:txBody>
+      </p:sp>
+      <p:sp>
+        <p:nvSpPr>
+          <p:cNvPr id="22" name="Rectangle 21">
+            <a:extLst>
+              <a:ext uri="{FF2B5EF4-FFF2-40B4-BE49-F238E27FC236}">
+                <a16:creationId xmlns:a16="http://schemas.microsoft.com/office/drawing/2014/main" id="{B720A16E-E31F-3356-92EE-02BD8CD9C98A}"/>
               </a:ext>
             </a:extLst>
           </p:cNvPr>
@@ -4540,7 +4575,7 @@
         </p:nvSpPr>
         <p:spPr>
           <a:xfrm>
-            <a:off x="7867271" y="3007752"/>
+            <a:off x="7760593" y="4083515"/>
             <a:ext cx="914400" cy="914400"/>
           </a:xfrm>
           <a:prstGeom prst="rect">
@@ -4548,7 +4583,8 @@
           </a:prstGeom>
           <a:solidFill>
             <a:schemeClr val="accent4">
-              <a:lumMod val="75000"/>
+              <a:lumMod val="40000"/>
+              <a:lumOff val="60000"/>
             </a:schemeClr>
           </a:solidFill>
           <a:ln w="28575">
@@ -4578,16 +4614,16 @@
           <a:lstStyle/>
           <a:p>
             <a:pPr algn="ctr"/>
-            <a:endParaRPr lang="en-US"/>
-          </a:p>
-        </p:txBody>
-      </p:sp>
-      <p:sp>
-        <p:nvSpPr>
-          <p:cNvPr id="12" name="Rectangle 11">
-            <a:extLst>
-              <a:ext uri="{FF2B5EF4-FFF2-40B4-BE49-F238E27FC236}">
-                <a16:creationId xmlns:a16="http://schemas.microsoft.com/office/drawing/2014/main" id="{BDE39744-B92C-486F-52A9-63B3C01D97A0}"/>
+            <a:endParaRPr lang="en-US" sz="4400" b="1"/>
+          </a:p>
+        </p:txBody>
+      </p:sp>
+      <p:sp>
+        <p:nvSpPr>
+          <p:cNvPr id="23" name="Rectangle 22">
+            <a:extLst>
+              <a:ext uri="{FF2B5EF4-FFF2-40B4-BE49-F238E27FC236}">
+                <a16:creationId xmlns:a16="http://schemas.microsoft.com/office/drawing/2014/main" id="{58E7B698-D733-6E52-69C0-ED50B8383920}"/>
               </a:ext>
             </a:extLst>
           </p:cNvPr>
@@ -4598,7 +4634,7 @@
         </p:nvSpPr>
         <p:spPr>
           <a:xfrm>
-            <a:off x="7867271" y="3922152"/>
+            <a:off x="7760593" y="3169115"/>
             <a:ext cx="914400" cy="914400"/>
           </a:xfrm>
           <a:prstGeom prst="rect">
@@ -4637,16 +4673,46 @@
           <a:lstStyle/>
           <a:p>
             <a:pPr algn="ctr"/>
-            <a:endParaRPr lang="en-US"/>
-          </a:p>
-        </p:txBody>
-      </p:sp>
-      <p:sp>
-        <p:nvSpPr>
-          <p:cNvPr id="2" name="Rectangle 1">
-            <a:extLst>
-              <a:ext uri="{FF2B5EF4-FFF2-40B4-BE49-F238E27FC236}">
-                <a16:creationId xmlns:a16="http://schemas.microsoft.com/office/drawing/2014/main" id="{8C310F88-35FB-3951-3D22-FA756A81A0A4}"/>
+            <a:endParaRPr lang="en-US" sz="4400" b="1"/>
+          </a:p>
+        </p:txBody>
+      </p:sp>
+    </p:spTree>
+    <p:extLst>
+      <p:ext uri="{BB962C8B-B14F-4D97-AF65-F5344CB8AC3E}">
+        <p14:creationId xmlns:p14="http://schemas.microsoft.com/office/powerpoint/2010/main" val="193486482"/>
+      </p:ext>
+    </p:extLst>
+  </p:cSld>
+  <p:clrMapOvr>
+    <a:masterClrMapping/>
+  </p:clrMapOvr>
+</p:sld>
+</file>
+
+<file path=ppt/slides/slide11.xml><?xml version="1.0" encoding="utf-8"?>
+<p:sld xmlns:a="http://schemas.openxmlformats.org/drawingml/2006/main" xmlns:r="http://schemas.openxmlformats.org/officeDocument/2006/relationships" xmlns:p="http://schemas.openxmlformats.org/presentationml/2006/main">
+  <p:cSld>
+    <p:spTree>
+      <p:nvGrpSpPr>
+        <p:cNvPr id="1" name=""/>
+        <p:cNvGrpSpPr/>
+        <p:nvPr/>
+      </p:nvGrpSpPr>
+      <p:grpSpPr>
+        <a:xfrm>
+          <a:off x="0" y="0"/>
+          <a:ext cx="0" cy="0"/>
+          <a:chOff x="0" y="0"/>
+          <a:chExt cx="0" cy="0"/>
+        </a:xfrm>
+      </p:grpSpPr>
+      <p:sp>
+        <p:nvSpPr>
+          <p:cNvPr id="7" name="Rectangle 6">
+            <a:extLst>
+              <a:ext uri="{FF2B5EF4-FFF2-40B4-BE49-F238E27FC236}">
+                <a16:creationId xmlns:a16="http://schemas.microsoft.com/office/drawing/2014/main" id="{1BE21053-4CD6-953A-7B7D-048B4AD0D53A}"/>
               </a:ext>
             </a:extLst>
           </p:cNvPr>
@@ -4657,7 +4723,7 @@
         </p:nvSpPr>
         <p:spPr>
           <a:xfrm>
-            <a:off x="8781671" y="3007752"/>
+            <a:off x="3426460" y="2550552"/>
             <a:ext cx="914400" cy="914400"/>
           </a:xfrm>
           <a:prstGeom prst="rect">
@@ -4693,16 +4759,19 @@
           <a:lstStyle/>
           <a:p>
             <a:pPr algn="ctr"/>
-            <a:endParaRPr lang="en-US"/>
-          </a:p>
-        </p:txBody>
-      </p:sp>
-      <p:sp>
-        <p:nvSpPr>
-          <p:cNvPr id="3" name="Rectangle 2">
-            <a:extLst>
-              <a:ext uri="{FF2B5EF4-FFF2-40B4-BE49-F238E27FC236}">
-                <a16:creationId xmlns:a16="http://schemas.microsoft.com/office/drawing/2014/main" id="{60A43C82-68DE-97FB-7E19-8151B5401ED4}"/>
+            <a:r>
+              <a:rPr lang="en-US" sz="4400" b="1" dirty="0"/>
+              <a:t>A</a:t>
+            </a:r>
+          </a:p>
+        </p:txBody>
+      </p:sp>
+      <p:sp>
+        <p:nvSpPr>
+          <p:cNvPr id="16" name="Rectangle 15">
+            <a:extLst>
+              <a:ext uri="{FF2B5EF4-FFF2-40B4-BE49-F238E27FC236}">
+                <a16:creationId xmlns:a16="http://schemas.microsoft.com/office/drawing/2014/main" id="{3EC4D57C-0440-BF33-11A6-840A3DED1E90}"/>
               </a:ext>
             </a:extLst>
           </p:cNvPr>
@@ -4713,7 +4782,7 @@
         </p:nvSpPr>
         <p:spPr>
           <a:xfrm>
-            <a:off x="8781671" y="3922152"/>
+            <a:off x="4336677" y="2550552"/>
             <a:ext cx="914400" cy="914400"/>
           </a:xfrm>
           <a:prstGeom prst="rect">
@@ -4752,7 +4821,721 @@
           <a:lstStyle/>
           <a:p>
             <a:pPr algn="ctr"/>
+            <a:r>
+              <a:rPr lang="en-US" sz="4400" b="1" dirty="0"/>
+              <a:t>B</a:t>
+            </a:r>
+          </a:p>
+        </p:txBody>
+      </p:sp>
+      <p:sp>
+        <p:nvSpPr>
+          <p:cNvPr id="17" name="Rectangle 16">
+            <a:extLst>
+              <a:ext uri="{FF2B5EF4-FFF2-40B4-BE49-F238E27FC236}">
+                <a16:creationId xmlns:a16="http://schemas.microsoft.com/office/drawing/2014/main" id="{7F4CF8F8-4023-9F8A-D4A3-5E4399790904}"/>
+              </a:ext>
+            </a:extLst>
+          </p:cNvPr>
+          <p:cNvSpPr>
+            <a:spLocks noChangeAspect="1"/>
+          </p:cNvSpPr>
+          <p:nvPr/>
+        </p:nvSpPr>
+        <p:spPr>
+          <a:xfrm>
+            <a:off x="3426460" y="4379352"/>
+            <a:ext cx="914400" cy="914400"/>
+          </a:xfrm>
+          <a:prstGeom prst="rect">
+            <a:avLst/>
+          </a:prstGeom>
+          <a:solidFill>
+            <a:schemeClr val="accent4">
+              <a:lumMod val="50000"/>
+            </a:schemeClr>
+          </a:solidFill>
+          <a:ln w="28575">
+            <a:solidFill>
+              <a:schemeClr val="bg1"/>
+            </a:solidFill>
+          </a:ln>
+        </p:spPr>
+        <p:style>
+          <a:lnRef idx="2">
+            <a:schemeClr val="accent1">
+              <a:shade val="50000"/>
+            </a:schemeClr>
+          </a:lnRef>
+          <a:fillRef idx="1">
+            <a:schemeClr val="accent1"/>
+          </a:fillRef>
+          <a:effectRef idx="0">
+            <a:schemeClr val="accent1"/>
+          </a:effectRef>
+          <a:fontRef idx="minor">
+            <a:schemeClr val="lt1"/>
+          </a:fontRef>
+        </p:style>
+        <p:txBody>
+          <a:bodyPr rtlCol="0" anchor="ctr"/>
+          <a:lstStyle/>
+          <a:p>
+            <a:pPr algn="ctr"/>
+            <a:endParaRPr lang="en-US" sz="4400" b="1"/>
+          </a:p>
+        </p:txBody>
+      </p:sp>
+      <p:sp>
+        <p:nvSpPr>
+          <p:cNvPr id="18" name="Rectangle 17">
+            <a:extLst>
+              <a:ext uri="{FF2B5EF4-FFF2-40B4-BE49-F238E27FC236}">
+                <a16:creationId xmlns:a16="http://schemas.microsoft.com/office/drawing/2014/main" id="{7923B18E-31C4-6DB5-13A7-161463AA7A90}"/>
+              </a:ext>
+            </a:extLst>
+          </p:cNvPr>
+          <p:cNvSpPr>
+            <a:spLocks noChangeAspect="1"/>
+          </p:cNvSpPr>
+          <p:nvPr/>
+        </p:nvSpPr>
+        <p:spPr>
+          <a:xfrm>
+            <a:off x="3426460" y="3464952"/>
+            <a:ext cx="914400" cy="914400"/>
+          </a:xfrm>
+          <a:prstGeom prst="rect">
+            <a:avLst/>
+          </a:prstGeom>
+          <a:solidFill>
+            <a:schemeClr val="accent4">
+              <a:lumMod val="75000"/>
+            </a:schemeClr>
+          </a:solidFill>
+          <a:ln w="28575">
+            <a:solidFill>
+              <a:schemeClr val="bg1"/>
+            </a:solidFill>
+          </a:ln>
+        </p:spPr>
+        <p:style>
+          <a:lnRef idx="2">
+            <a:schemeClr val="accent1">
+              <a:shade val="50000"/>
+            </a:schemeClr>
+          </a:lnRef>
+          <a:fillRef idx="1">
+            <a:schemeClr val="accent1"/>
+          </a:fillRef>
+          <a:effectRef idx="0">
+            <a:schemeClr val="accent1"/>
+          </a:effectRef>
+          <a:fontRef idx="minor">
+            <a:schemeClr val="lt1"/>
+          </a:fontRef>
+        </p:style>
+        <p:txBody>
+          <a:bodyPr rtlCol="0" anchor="ctr"/>
+          <a:lstStyle/>
+          <a:p>
+            <a:pPr algn="ctr"/>
+            <a:endParaRPr lang="en-US" sz="4400" b="1"/>
+          </a:p>
+        </p:txBody>
+      </p:sp>
+      <p:sp>
+        <p:nvSpPr>
+          <p:cNvPr id="22" name="Rectangle 21">
+            <a:extLst>
+              <a:ext uri="{FF2B5EF4-FFF2-40B4-BE49-F238E27FC236}">
+                <a16:creationId xmlns:a16="http://schemas.microsoft.com/office/drawing/2014/main" id="{B720A16E-E31F-3356-92EE-02BD8CD9C98A}"/>
+              </a:ext>
+            </a:extLst>
+          </p:cNvPr>
+          <p:cNvSpPr>
+            <a:spLocks noChangeAspect="1"/>
+          </p:cNvSpPr>
+          <p:nvPr/>
+        </p:nvSpPr>
+        <p:spPr>
+          <a:xfrm>
+            <a:off x="4336677" y="4379352"/>
+            <a:ext cx="914400" cy="914400"/>
+          </a:xfrm>
+          <a:prstGeom prst="rect">
+            <a:avLst/>
+          </a:prstGeom>
+          <a:solidFill>
+            <a:schemeClr val="accent4">
+              <a:lumMod val="40000"/>
+              <a:lumOff val="60000"/>
+            </a:schemeClr>
+          </a:solidFill>
+          <a:ln w="28575">
+            <a:solidFill>
+              <a:schemeClr val="bg1"/>
+            </a:solidFill>
+          </a:ln>
+        </p:spPr>
+        <p:style>
+          <a:lnRef idx="2">
+            <a:schemeClr val="accent1">
+              <a:shade val="50000"/>
+            </a:schemeClr>
+          </a:lnRef>
+          <a:fillRef idx="1">
+            <a:schemeClr val="accent1"/>
+          </a:fillRef>
+          <a:effectRef idx="0">
+            <a:schemeClr val="accent1"/>
+          </a:effectRef>
+          <a:fontRef idx="minor">
+            <a:schemeClr val="lt1"/>
+          </a:fontRef>
+        </p:style>
+        <p:txBody>
+          <a:bodyPr rtlCol="0" anchor="ctr"/>
+          <a:lstStyle/>
+          <a:p>
+            <a:pPr algn="ctr"/>
+            <a:endParaRPr lang="en-US" sz="4400" b="1"/>
+          </a:p>
+        </p:txBody>
+      </p:sp>
+      <p:sp>
+        <p:nvSpPr>
+          <p:cNvPr id="23" name="Rectangle 22">
+            <a:extLst>
+              <a:ext uri="{FF2B5EF4-FFF2-40B4-BE49-F238E27FC236}">
+                <a16:creationId xmlns:a16="http://schemas.microsoft.com/office/drawing/2014/main" id="{58E7B698-D733-6E52-69C0-ED50B8383920}"/>
+              </a:ext>
+            </a:extLst>
+          </p:cNvPr>
+          <p:cNvSpPr>
+            <a:spLocks noChangeAspect="1"/>
+          </p:cNvSpPr>
+          <p:nvPr/>
+        </p:nvSpPr>
+        <p:spPr>
+          <a:xfrm>
+            <a:off x="4336677" y="3464952"/>
+            <a:ext cx="914400" cy="914400"/>
+          </a:xfrm>
+          <a:prstGeom prst="rect">
+            <a:avLst/>
+          </a:prstGeom>
+          <a:solidFill>
+            <a:schemeClr val="accent4">
+              <a:lumMod val="40000"/>
+              <a:lumOff val="60000"/>
+            </a:schemeClr>
+          </a:solidFill>
+          <a:ln w="28575">
+            <a:solidFill>
+              <a:schemeClr val="bg1"/>
+            </a:solidFill>
+          </a:ln>
+        </p:spPr>
+        <p:style>
+          <a:lnRef idx="2">
+            <a:schemeClr val="accent1">
+              <a:shade val="50000"/>
+            </a:schemeClr>
+          </a:lnRef>
+          <a:fillRef idx="1">
+            <a:schemeClr val="accent1"/>
+          </a:fillRef>
+          <a:effectRef idx="0">
+            <a:schemeClr val="accent1"/>
+          </a:effectRef>
+          <a:fontRef idx="minor">
+            <a:schemeClr val="lt1"/>
+          </a:fontRef>
+        </p:style>
+        <p:txBody>
+          <a:bodyPr rtlCol="0" anchor="ctr"/>
+          <a:lstStyle/>
+          <a:p>
+            <a:pPr algn="ctr"/>
+            <a:endParaRPr lang="en-US" sz="4400" b="1"/>
+          </a:p>
+        </p:txBody>
+      </p:sp>
+      <p:sp>
+        <p:nvSpPr>
+          <p:cNvPr id="5" name="Rectangle 4">
+            <a:extLst>
+              <a:ext uri="{FF2B5EF4-FFF2-40B4-BE49-F238E27FC236}">
+                <a16:creationId xmlns:a16="http://schemas.microsoft.com/office/drawing/2014/main" id="{01F4FA83-0791-ABF4-2495-25FB6E73359D}"/>
+              </a:ext>
+            </a:extLst>
+          </p:cNvPr>
+          <p:cNvSpPr>
+            <a:spLocks noChangeAspect="1"/>
+          </p:cNvSpPr>
+          <p:nvPr/>
+        </p:nvSpPr>
+        <p:spPr>
+          <a:xfrm>
+            <a:off x="-1" y="0"/>
+            <a:ext cx="4733366" cy="914400"/>
+          </a:xfrm>
+          <a:prstGeom prst="rect">
+            <a:avLst/>
+          </a:prstGeom>
+          <a:solidFill>
+            <a:schemeClr val="accent4"/>
+          </a:solidFill>
+          <a:ln w="28575">
+            <a:solidFill>
+              <a:schemeClr val="bg1"/>
+            </a:solidFill>
+          </a:ln>
+        </p:spPr>
+        <p:style>
+          <a:lnRef idx="2">
+            <a:schemeClr val="accent1">
+              <a:shade val="50000"/>
+            </a:schemeClr>
+          </a:lnRef>
+          <a:fillRef idx="1">
+            <a:schemeClr val="accent1"/>
+          </a:fillRef>
+          <a:effectRef idx="0">
+            <a:schemeClr val="accent1"/>
+          </a:effectRef>
+          <a:fontRef idx="minor">
+            <a:schemeClr val="lt1"/>
+          </a:fontRef>
+        </p:style>
+        <p:txBody>
+          <a:bodyPr rtlCol="0" anchor="ctr"/>
+          <a:lstStyle/>
+          <a:p>
+            <a:pPr algn="ctr"/>
+            <a:r>
+              <a:rPr lang="en-US" sz="3200" b="1" dirty="0"/>
+              <a:t>Reshaping: Pivot Wider</a:t>
+            </a:r>
+          </a:p>
+        </p:txBody>
+      </p:sp>
+      <p:sp>
+        <p:nvSpPr>
+          <p:cNvPr id="6" name="Right Arrow 5">
+            <a:extLst>
+              <a:ext uri="{FF2B5EF4-FFF2-40B4-BE49-F238E27FC236}">
+                <a16:creationId xmlns:a16="http://schemas.microsoft.com/office/drawing/2014/main" id="{2E2BA415-57C2-4ABA-2DF2-70857FFA5565}"/>
+              </a:ext>
+            </a:extLst>
+          </p:cNvPr>
+          <p:cNvSpPr/>
+          <p:nvPr/>
+        </p:nvSpPr>
+        <p:spPr>
+          <a:xfrm>
+            <a:off x="5642683" y="3659934"/>
+            <a:ext cx="914400" cy="524435"/>
+          </a:xfrm>
+          <a:prstGeom prst="rightArrow">
+            <a:avLst/>
+          </a:prstGeom>
+          <a:solidFill>
+            <a:schemeClr val="tx2">
+              <a:lumMod val="40000"/>
+              <a:lumOff val="60000"/>
+            </a:schemeClr>
+          </a:solidFill>
+          <a:ln w="28575">
+            <a:solidFill>
+              <a:schemeClr val="tx2"/>
+            </a:solidFill>
+          </a:ln>
+        </p:spPr>
+        <p:style>
+          <a:lnRef idx="2">
+            <a:schemeClr val="accent1">
+              <a:shade val="50000"/>
+            </a:schemeClr>
+          </a:lnRef>
+          <a:fillRef idx="1">
+            <a:schemeClr val="accent1"/>
+          </a:fillRef>
+          <a:effectRef idx="0">
+            <a:schemeClr val="accent1"/>
+          </a:effectRef>
+          <a:fontRef idx="minor">
+            <a:schemeClr val="lt1"/>
+          </a:fontRef>
+        </p:style>
+        <p:txBody>
+          <a:bodyPr rtlCol="0" anchor="ctr"/>
+          <a:lstStyle/>
+          <a:p>
+            <a:pPr algn="ctr"/>
             <a:endParaRPr lang="en-US"/>
+          </a:p>
+        </p:txBody>
+      </p:sp>
+      <p:sp>
+        <p:nvSpPr>
+          <p:cNvPr id="9" name="Rectangle 8">
+            <a:extLst>
+              <a:ext uri="{FF2B5EF4-FFF2-40B4-BE49-F238E27FC236}">
+                <a16:creationId xmlns:a16="http://schemas.microsoft.com/office/drawing/2014/main" id="{B25364AF-F4B4-A6BB-CA44-15A4671FFC87}"/>
+              </a:ext>
+            </a:extLst>
+          </p:cNvPr>
+          <p:cNvSpPr>
+            <a:spLocks noChangeAspect="1"/>
+          </p:cNvSpPr>
+          <p:nvPr/>
+        </p:nvSpPr>
+        <p:spPr>
+          <a:xfrm>
+            <a:off x="7863089" y="3007752"/>
+            <a:ext cx="914400" cy="914400"/>
+          </a:xfrm>
+          <a:prstGeom prst="rect">
+            <a:avLst/>
+          </a:prstGeom>
+          <a:solidFill>
+            <a:schemeClr val="accent4">
+              <a:lumMod val="75000"/>
+            </a:schemeClr>
+          </a:solidFill>
+          <a:ln w="28575">
+            <a:solidFill>
+              <a:schemeClr val="bg1"/>
+            </a:solidFill>
+          </a:ln>
+        </p:spPr>
+        <p:style>
+          <a:lnRef idx="2">
+            <a:schemeClr val="accent1">
+              <a:shade val="50000"/>
+            </a:schemeClr>
+          </a:lnRef>
+          <a:fillRef idx="1">
+            <a:schemeClr val="accent1"/>
+          </a:fillRef>
+          <a:effectRef idx="0">
+            <a:schemeClr val="accent1"/>
+          </a:effectRef>
+          <a:fontRef idx="minor">
+            <a:schemeClr val="lt1"/>
+          </a:fontRef>
+        </p:style>
+        <p:txBody>
+          <a:bodyPr rtlCol="0" anchor="ctr"/>
+          <a:lstStyle/>
+          <a:p>
+            <a:pPr algn="ctr"/>
+            <a:r>
+              <a:rPr lang="en-US" sz="4400" b="1" dirty="0"/>
+              <a:t>C</a:t>
+            </a:r>
+          </a:p>
+        </p:txBody>
+      </p:sp>
+      <p:sp>
+        <p:nvSpPr>
+          <p:cNvPr id="10" name="Rectangle 9">
+            <a:extLst>
+              <a:ext uri="{FF2B5EF4-FFF2-40B4-BE49-F238E27FC236}">
+                <a16:creationId xmlns:a16="http://schemas.microsoft.com/office/drawing/2014/main" id="{9685F398-8909-B531-2109-22EBC59413B5}"/>
+              </a:ext>
+            </a:extLst>
+          </p:cNvPr>
+          <p:cNvSpPr>
+            <a:spLocks noChangeAspect="1"/>
+          </p:cNvSpPr>
+          <p:nvPr/>
+        </p:nvSpPr>
+        <p:spPr>
+          <a:xfrm>
+            <a:off x="7863089" y="3922152"/>
+            <a:ext cx="914400" cy="914400"/>
+          </a:xfrm>
+          <a:prstGeom prst="rect">
+            <a:avLst/>
+          </a:prstGeom>
+          <a:solidFill>
+            <a:schemeClr val="accent4">
+              <a:lumMod val="40000"/>
+              <a:lumOff val="60000"/>
+            </a:schemeClr>
+          </a:solidFill>
+          <a:ln w="28575">
+            <a:solidFill>
+              <a:schemeClr val="bg1"/>
+            </a:solidFill>
+          </a:ln>
+        </p:spPr>
+        <p:style>
+          <a:lnRef idx="2">
+            <a:schemeClr val="accent1">
+              <a:shade val="50000"/>
+            </a:schemeClr>
+          </a:lnRef>
+          <a:fillRef idx="1">
+            <a:schemeClr val="accent1"/>
+          </a:fillRef>
+          <a:effectRef idx="0">
+            <a:schemeClr val="accent1"/>
+          </a:effectRef>
+          <a:fontRef idx="minor">
+            <a:schemeClr val="lt1"/>
+          </a:fontRef>
+        </p:style>
+        <p:txBody>
+          <a:bodyPr rtlCol="0" anchor="ctr"/>
+          <a:lstStyle/>
+          <a:p>
+            <a:pPr algn="ctr"/>
+            <a:endParaRPr lang="en-US" sz="4400" b="1"/>
+          </a:p>
+        </p:txBody>
+      </p:sp>
+      <p:sp>
+        <p:nvSpPr>
+          <p:cNvPr id="11" name="Rectangle 10">
+            <a:extLst>
+              <a:ext uri="{FF2B5EF4-FFF2-40B4-BE49-F238E27FC236}">
+                <a16:creationId xmlns:a16="http://schemas.microsoft.com/office/drawing/2014/main" id="{AEE4741C-8ECE-8AA6-1084-01054448B958}"/>
+              </a:ext>
+            </a:extLst>
+          </p:cNvPr>
+          <p:cNvSpPr>
+            <a:spLocks noChangeAspect="1"/>
+          </p:cNvSpPr>
+          <p:nvPr/>
+        </p:nvSpPr>
+        <p:spPr>
+          <a:xfrm>
+            <a:off x="8777489" y="3007752"/>
+            <a:ext cx="914400" cy="914400"/>
+          </a:xfrm>
+          <a:prstGeom prst="rect">
+            <a:avLst/>
+          </a:prstGeom>
+          <a:solidFill>
+            <a:schemeClr val="accent4">
+              <a:lumMod val="50000"/>
+            </a:schemeClr>
+          </a:solidFill>
+          <a:ln w="28575">
+            <a:solidFill>
+              <a:schemeClr val="bg1"/>
+            </a:solidFill>
+          </a:ln>
+        </p:spPr>
+        <p:style>
+          <a:lnRef idx="2">
+            <a:schemeClr val="accent1">
+              <a:shade val="50000"/>
+            </a:schemeClr>
+          </a:lnRef>
+          <a:fillRef idx="1">
+            <a:schemeClr val="accent1"/>
+          </a:fillRef>
+          <a:effectRef idx="0">
+            <a:schemeClr val="accent1"/>
+          </a:effectRef>
+          <a:fontRef idx="minor">
+            <a:schemeClr val="lt1"/>
+          </a:fontRef>
+        </p:style>
+        <p:txBody>
+          <a:bodyPr rtlCol="0" anchor="ctr"/>
+          <a:lstStyle/>
+          <a:p>
+            <a:pPr algn="ctr"/>
+            <a:r>
+              <a:rPr lang="en-US" sz="4400" b="1" dirty="0"/>
+              <a:t>D</a:t>
+            </a:r>
+          </a:p>
+        </p:txBody>
+      </p:sp>
+      <p:sp>
+        <p:nvSpPr>
+          <p:cNvPr id="12" name="Rectangle 11">
+            <a:extLst>
+              <a:ext uri="{FF2B5EF4-FFF2-40B4-BE49-F238E27FC236}">
+                <a16:creationId xmlns:a16="http://schemas.microsoft.com/office/drawing/2014/main" id="{BDE39744-B92C-486F-52A9-63B3C01D97A0}"/>
+              </a:ext>
+            </a:extLst>
+          </p:cNvPr>
+          <p:cNvSpPr>
+            <a:spLocks noChangeAspect="1"/>
+          </p:cNvSpPr>
+          <p:nvPr/>
+        </p:nvSpPr>
+        <p:spPr>
+          <a:xfrm>
+            <a:off x="8777489" y="3922152"/>
+            <a:ext cx="914400" cy="914400"/>
+          </a:xfrm>
+          <a:prstGeom prst="rect">
+            <a:avLst/>
+          </a:prstGeom>
+          <a:solidFill>
+            <a:schemeClr val="accent4">
+              <a:lumMod val="40000"/>
+              <a:lumOff val="60000"/>
+            </a:schemeClr>
+          </a:solidFill>
+          <a:ln w="28575">
+            <a:solidFill>
+              <a:schemeClr val="bg1"/>
+            </a:solidFill>
+          </a:ln>
+        </p:spPr>
+        <p:style>
+          <a:lnRef idx="2">
+            <a:schemeClr val="accent1">
+              <a:shade val="50000"/>
+            </a:schemeClr>
+          </a:lnRef>
+          <a:fillRef idx="1">
+            <a:schemeClr val="accent1"/>
+          </a:fillRef>
+          <a:effectRef idx="0">
+            <a:schemeClr val="accent1"/>
+          </a:effectRef>
+          <a:fontRef idx="minor">
+            <a:schemeClr val="lt1"/>
+          </a:fontRef>
+        </p:style>
+        <p:txBody>
+          <a:bodyPr rtlCol="0" anchor="ctr"/>
+          <a:lstStyle/>
+          <a:p>
+            <a:pPr algn="ctr"/>
+            <a:endParaRPr lang="en-US" sz="4400" b="1"/>
+          </a:p>
+        </p:txBody>
+      </p:sp>
+      <p:sp>
+        <p:nvSpPr>
+          <p:cNvPr id="4" name="Rectangle 3">
+            <a:extLst>
+              <a:ext uri="{FF2B5EF4-FFF2-40B4-BE49-F238E27FC236}">
+                <a16:creationId xmlns:a16="http://schemas.microsoft.com/office/drawing/2014/main" id="{8885C728-58D8-FA20-3E45-1F15024C9F67}"/>
+              </a:ext>
+            </a:extLst>
+          </p:cNvPr>
+          <p:cNvSpPr>
+            <a:spLocks noChangeAspect="1"/>
+          </p:cNvSpPr>
+          <p:nvPr/>
+        </p:nvSpPr>
+        <p:spPr>
+          <a:xfrm>
+            <a:off x="6948689" y="3007752"/>
+            <a:ext cx="914400" cy="914400"/>
+          </a:xfrm>
+          <a:prstGeom prst="rect">
+            <a:avLst/>
+          </a:prstGeom>
+          <a:solidFill>
+            <a:schemeClr val="accent4"/>
+          </a:solidFill>
+          <a:ln w="28575">
+            <a:solidFill>
+              <a:schemeClr val="bg1"/>
+            </a:solidFill>
+          </a:ln>
+        </p:spPr>
+        <p:style>
+          <a:lnRef idx="2">
+            <a:schemeClr val="accent1">
+              <a:shade val="50000"/>
+            </a:schemeClr>
+          </a:lnRef>
+          <a:fillRef idx="1">
+            <a:schemeClr val="accent1"/>
+          </a:fillRef>
+          <a:effectRef idx="0">
+            <a:schemeClr val="accent1"/>
+          </a:effectRef>
+          <a:fontRef idx="minor">
+            <a:schemeClr val="lt1"/>
+          </a:fontRef>
+        </p:style>
+        <p:txBody>
+          <a:bodyPr rtlCol="0" anchor="ctr"/>
+          <a:lstStyle/>
+          <a:p>
+            <a:pPr algn="ctr"/>
+            <a:r>
+              <a:rPr lang="en-US" sz="4400" b="1" dirty="0"/>
+              <a:t>A</a:t>
+            </a:r>
+          </a:p>
+        </p:txBody>
+      </p:sp>
+      <p:sp>
+        <p:nvSpPr>
+          <p:cNvPr id="8" name="Rectangle 7">
+            <a:extLst>
+              <a:ext uri="{FF2B5EF4-FFF2-40B4-BE49-F238E27FC236}">
+                <a16:creationId xmlns:a16="http://schemas.microsoft.com/office/drawing/2014/main" id="{9BD585A7-ECA5-6F9D-7FC3-E67E48D21B60}"/>
+              </a:ext>
+            </a:extLst>
+          </p:cNvPr>
+          <p:cNvSpPr>
+            <a:spLocks noChangeAspect="1"/>
+          </p:cNvSpPr>
+          <p:nvPr/>
+        </p:nvSpPr>
+        <p:spPr>
+          <a:xfrm>
+            <a:off x="6948689" y="3922152"/>
+            <a:ext cx="914400" cy="914400"/>
+          </a:xfrm>
+          <a:prstGeom prst="rect">
+            <a:avLst/>
+          </a:prstGeom>
+          <a:solidFill>
+            <a:schemeClr val="accent4">
+              <a:lumMod val="60000"/>
+              <a:lumOff val="40000"/>
+            </a:schemeClr>
+          </a:solidFill>
+          <a:ln w="28575">
+            <a:solidFill>
+              <a:schemeClr val="bg1"/>
+            </a:solidFill>
+          </a:ln>
+        </p:spPr>
+        <p:style>
+          <a:lnRef idx="2">
+            <a:schemeClr val="accent1">
+              <a:shade val="50000"/>
+            </a:schemeClr>
+          </a:lnRef>
+          <a:fillRef idx="1">
+            <a:schemeClr val="accent1"/>
+          </a:fillRef>
+          <a:effectRef idx="0">
+            <a:schemeClr val="accent1"/>
+          </a:effectRef>
+          <a:fontRef idx="minor">
+            <a:schemeClr val="lt1"/>
+          </a:fontRef>
+        </p:style>
+        <p:txBody>
+          <a:bodyPr rtlCol="0" anchor="ctr"/>
+          <a:lstStyle/>
+          <a:p>
+            <a:pPr algn="ctr"/>
+            <a:r>
+              <a:rPr lang="en-US" sz="4400" b="1" dirty="0"/>
+              <a:t>B</a:t>
+            </a:r>
           </a:p>
         </p:txBody>
       </p:sp>
@@ -4840,7 +5623,10 @@
           <a:lstStyle/>
           <a:p>
             <a:pPr algn="ctr"/>
-            <a:endParaRPr lang="en-US"/>
+            <a:r>
+              <a:rPr lang="en-US" sz="4400" b="1" dirty="0"/>
+              <a:t>A</a:t>
+            </a:r>
           </a:p>
         </p:txBody>
       </p:sp>
@@ -4899,7 +5685,7 @@
           <a:lstStyle/>
           <a:p>
             <a:pPr algn="ctr"/>
-            <a:endParaRPr lang="en-US"/>
+            <a:endParaRPr lang="en-US" sz="4400" b="1"/>
           </a:p>
         </p:txBody>
       </p:sp>
@@ -4958,7 +5744,7 @@
           <a:lstStyle/>
           <a:p>
             <a:pPr algn="ctr"/>
-            <a:endParaRPr lang="en-US"/>
+            <a:endParaRPr lang="en-US" sz="4400" b="1"/>
           </a:p>
         </p:txBody>
       </p:sp>
@@ -5017,7 +5803,7 @@
           <a:lstStyle/>
           <a:p>
             <a:pPr algn="ctr"/>
-            <a:endParaRPr lang="en-US"/>
+            <a:endParaRPr lang="en-US" sz="4400" b="1"/>
           </a:p>
         </p:txBody>
       </p:sp>
@@ -5191,7 +5977,10 @@
           <a:lstStyle/>
           <a:p>
             <a:pPr algn="ctr"/>
-            <a:endParaRPr lang="en-US"/>
+            <a:r>
+              <a:rPr lang="en-US" sz="4400" b="1" dirty="0"/>
+              <a:t>A</a:t>
+            </a:r>
           </a:p>
         </p:txBody>
       </p:sp>
@@ -5226,6 +6015,231 @@
           <a:ln w="28575">
             <a:solidFill>
               <a:schemeClr val="bg1"/>
+            </a:solidFill>
+          </a:ln>
+        </p:spPr>
+        <p:style>
+          <a:lnRef idx="2">
+            <a:schemeClr val="accent1">
+              <a:shade val="50000"/>
+            </a:schemeClr>
+          </a:lnRef>
+          <a:fillRef idx="1">
+            <a:schemeClr val="accent1"/>
+          </a:fillRef>
+          <a:effectRef idx="0">
+            <a:schemeClr val="accent1"/>
+          </a:effectRef>
+          <a:fontRef idx="minor">
+            <a:schemeClr val="lt1"/>
+          </a:fontRef>
+        </p:style>
+        <p:txBody>
+          <a:bodyPr rtlCol="0" anchor="ctr"/>
+          <a:lstStyle/>
+          <a:p>
+            <a:pPr algn="ctr"/>
+            <a:endParaRPr lang="en-US" sz="4400" b="1"/>
+          </a:p>
+        </p:txBody>
+      </p:sp>
+      <p:sp>
+        <p:nvSpPr>
+          <p:cNvPr id="3" name="Triangle 2">
+            <a:extLst>
+              <a:ext uri="{FF2B5EF4-FFF2-40B4-BE49-F238E27FC236}">
+                <a16:creationId xmlns:a16="http://schemas.microsoft.com/office/drawing/2014/main" id="{DD5711ED-F82E-382B-17CB-DAA1ACA340D0}"/>
+              </a:ext>
+            </a:extLst>
+          </p:cNvPr>
+          <p:cNvSpPr/>
+          <p:nvPr/>
+        </p:nvSpPr>
+        <p:spPr>
+          <a:xfrm rot="10800000">
+            <a:off x="4573946" y="4332771"/>
+            <a:ext cx="548640" cy="457200"/>
+          </a:xfrm>
+          <a:prstGeom prst="triangle">
+            <a:avLst/>
+          </a:prstGeom>
+          <a:noFill/>
+          <a:ln w="28575">
+            <a:solidFill>
+              <a:schemeClr val="accent2">
+                <a:lumMod val="75000"/>
+              </a:schemeClr>
+            </a:solidFill>
+          </a:ln>
+        </p:spPr>
+        <p:style>
+          <a:lnRef idx="2">
+            <a:schemeClr val="accent1">
+              <a:shade val="50000"/>
+            </a:schemeClr>
+          </a:lnRef>
+          <a:fillRef idx="1">
+            <a:schemeClr val="accent1"/>
+          </a:fillRef>
+          <a:effectRef idx="0">
+            <a:schemeClr val="accent1"/>
+          </a:effectRef>
+          <a:fontRef idx="minor">
+            <a:schemeClr val="lt1"/>
+          </a:fontRef>
+        </p:style>
+        <p:txBody>
+          <a:bodyPr rtlCol="0" anchor="ctr"/>
+          <a:lstStyle/>
+          <a:p>
+            <a:pPr algn="ctr"/>
+            <a:endParaRPr lang="en-US"/>
+          </a:p>
+        </p:txBody>
+      </p:sp>
+      <p:sp>
+        <p:nvSpPr>
+          <p:cNvPr id="9" name="Diamond 8">
+            <a:extLst>
+              <a:ext uri="{FF2B5EF4-FFF2-40B4-BE49-F238E27FC236}">
+                <a16:creationId xmlns:a16="http://schemas.microsoft.com/office/drawing/2014/main" id="{686BF702-4B22-5D31-8480-96A7A72D3316}"/>
+              </a:ext>
+            </a:extLst>
+          </p:cNvPr>
+          <p:cNvSpPr>
+            <a:spLocks noChangeAspect="1"/>
+          </p:cNvSpPr>
+          <p:nvPr/>
+        </p:nvSpPr>
+        <p:spPr>
+          <a:xfrm>
+            <a:off x="4573946" y="5155731"/>
+            <a:ext cx="548640" cy="548640"/>
+          </a:xfrm>
+          <a:prstGeom prst="diamond">
+            <a:avLst/>
+          </a:prstGeom>
+          <a:noFill/>
+          <a:ln w="28575">
+            <a:solidFill>
+              <a:schemeClr val="accent2">
+                <a:lumMod val="75000"/>
+              </a:schemeClr>
+            </a:solidFill>
+          </a:ln>
+        </p:spPr>
+        <p:style>
+          <a:lnRef idx="2">
+            <a:schemeClr val="accent1">
+              <a:shade val="50000"/>
+            </a:schemeClr>
+          </a:lnRef>
+          <a:fillRef idx="1">
+            <a:schemeClr val="accent1"/>
+          </a:fillRef>
+          <a:effectRef idx="0">
+            <a:schemeClr val="accent1"/>
+          </a:effectRef>
+          <a:fontRef idx="minor">
+            <a:schemeClr val="lt1"/>
+          </a:fontRef>
+        </p:style>
+        <p:txBody>
+          <a:bodyPr rtlCol="0" anchor="ctr"/>
+          <a:lstStyle/>
+          <a:p>
+            <a:pPr algn="ctr"/>
+            <a:endParaRPr lang="en-US"/>
+          </a:p>
+        </p:txBody>
+      </p:sp>
+      <p:sp>
+        <p:nvSpPr>
+          <p:cNvPr id="10" name="Hexagon 9">
+            <a:extLst>
+              <a:ext uri="{FF2B5EF4-FFF2-40B4-BE49-F238E27FC236}">
+                <a16:creationId xmlns:a16="http://schemas.microsoft.com/office/drawing/2014/main" id="{F1421366-925D-67CA-F58C-71F37E909563}"/>
+              </a:ext>
+            </a:extLst>
+          </p:cNvPr>
+          <p:cNvSpPr>
+            <a:spLocks noChangeAspect="1"/>
+          </p:cNvSpPr>
+          <p:nvPr/>
+        </p:nvSpPr>
+        <p:spPr>
+          <a:xfrm rot="5400000">
+            <a:off x="4526649" y="3335669"/>
+            <a:ext cx="640080" cy="551793"/>
+          </a:xfrm>
+          <a:prstGeom prst="hexagon">
+            <a:avLst>
+              <a:gd name="adj" fmla="val 35104"/>
+              <a:gd name="vf" fmla="val 115470"/>
+            </a:avLst>
+          </a:prstGeom>
+          <a:noFill/>
+          <a:ln w="28575">
+            <a:solidFill>
+              <a:schemeClr val="accent2">
+                <a:lumMod val="75000"/>
+              </a:schemeClr>
+            </a:solidFill>
+          </a:ln>
+        </p:spPr>
+        <p:style>
+          <a:lnRef idx="2">
+            <a:schemeClr val="accent1">
+              <a:shade val="50000"/>
+            </a:schemeClr>
+          </a:lnRef>
+          <a:fillRef idx="1">
+            <a:schemeClr val="accent1"/>
+          </a:fillRef>
+          <a:effectRef idx="0">
+            <a:schemeClr val="accent1"/>
+          </a:effectRef>
+          <a:fontRef idx="minor">
+            <a:schemeClr val="lt1"/>
+          </a:fontRef>
+        </p:style>
+        <p:txBody>
+          <a:bodyPr rtlCol="0" anchor="ctr"/>
+          <a:lstStyle/>
+          <a:p>
+            <a:pPr algn="ctr"/>
+            <a:endParaRPr lang="en-US"/>
+          </a:p>
+        </p:txBody>
+      </p:sp>
+      <p:sp>
+        <p:nvSpPr>
+          <p:cNvPr id="12" name="Diamond 11">
+            <a:extLst>
+              <a:ext uri="{FF2B5EF4-FFF2-40B4-BE49-F238E27FC236}">
+                <a16:creationId xmlns:a16="http://schemas.microsoft.com/office/drawing/2014/main" id="{FEC440BE-F81C-369A-34F4-48F78A64BCD1}"/>
+              </a:ext>
+            </a:extLst>
+          </p:cNvPr>
+          <p:cNvSpPr>
+            <a:spLocks noChangeAspect="1"/>
+          </p:cNvSpPr>
+          <p:nvPr/>
+        </p:nvSpPr>
+        <p:spPr>
+          <a:xfrm>
+            <a:off x="7182676" y="4246087"/>
+            <a:ext cx="548640" cy="548640"/>
+          </a:xfrm>
+          <a:prstGeom prst="diamond">
+            <a:avLst/>
+          </a:prstGeom>
+          <a:noFill/>
+          <a:ln w="28575">
+            <a:solidFill>
+              <a:schemeClr val="accent2">
+                <a:lumMod val="75000"/>
+              </a:schemeClr>
             </a:solidFill>
           </a:ln>
         </p:spPr>
@@ -5338,7 +6352,10 @@
           <a:lstStyle/>
           <a:p>
             <a:pPr algn="ctr"/>
-            <a:endParaRPr lang="en-US"/>
+            <a:r>
+              <a:rPr lang="en-US" sz="4400" b="1" dirty="0"/>
+              <a:t>B</a:t>
+            </a:r>
           </a:p>
         </p:txBody>
       </p:sp>
@@ -5366,8 +6383,8 @@
           </a:prstGeom>
           <a:solidFill>
             <a:schemeClr val="accent2">
-              <a:lumMod val="40000"/>
-              <a:lumOff val="60000"/>
+              <a:lumMod val="20000"/>
+              <a:lumOff val="80000"/>
             </a:schemeClr>
           </a:solidFill>
           <a:ln w="28575">
@@ -5397,7 +6414,7 @@
           <a:lstStyle/>
           <a:p>
             <a:pPr algn="ctr"/>
-            <a:endParaRPr lang="en-US"/>
+            <a:endParaRPr lang="en-US" sz="4400" b="1"/>
           </a:p>
         </p:txBody>
       </p:sp>
@@ -5453,7 +6470,10 @@
           <a:lstStyle/>
           <a:p>
             <a:pPr algn="ctr"/>
-            <a:endParaRPr lang="en-US"/>
+            <a:r>
+              <a:rPr lang="en-US" sz="4400" b="1" dirty="0"/>
+              <a:t>C</a:t>
+            </a:r>
           </a:p>
         </p:txBody>
       </p:sp>
@@ -5481,8 +6501,8 @@
           </a:prstGeom>
           <a:solidFill>
             <a:schemeClr val="accent2">
-              <a:lumMod val="40000"/>
-              <a:lumOff val="60000"/>
+              <a:lumMod val="20000"/>
+              <a:lumOff val="80000"/>
             </a:schemeClr>
           </a:solidFill>
           <a:ln w="28575">
@@ -5512,7 +6532,7 @@
           <a:lstStyle/>
           <a:p>
             <a:pPr algn="ctr"/>
-            <a:endParaRPr lang="en-US"/>
+            <a:endParaRPr lang="en-US" sz="4400" b="1"/>
           </a:p>
         </p:txBody>
       </p:sp>
@@ -5570,7 +6590,10 @@
           <a:lstStyle/>
           <a:p>
             <a:pPr algn="ctr"/>
-            <a:endParaRPr lang="en-US"/>
+            <a:r>
+              <a:rPr lang="en-US" sz="4400" b="1" dirty="0"/>
+              <a:t>A</a:t>
+            </a:r>
           </a:p>
         </p:txBody>
       </p:sp>
@@ -5629,7 +6652,7 @@
           <a:lstStyle/>
           <a:p>
             <a:pPr algn="ctr"/>
-            <a:endParaRPr lang="en-US"/>
+            <a:endParaRPr lang="en-US" sz="4400" b="1"/>
           </a:p>
         </p:txBody>
       </p:sp>
@@ -5803,7 +6826,10 @@
           <a:lstStyle/>
           <a:p>
             <a:pPr algn="ctr"/>
-            <a:endParaRPr lang="en-US"/>
+            <a:r>
+              <a:rPr lang="en-US" sz="4400" b="1" dirty="0"/>
+              <a:t>A</a:t>
+            </a:r>
           </a:p>
         </p:txBody>
       </p:sp>
@@ -5862,7 +6888,7 @@
           <a:lstStyle/>
           <a:p>
             <a:pPr algn="ctr"/>
-            <a:endParaRPr lang="en-US" dirty="0"/>
+            <a:endParaRPr lang="en-US" sz="4400" b="1" dirty="0"/>
           </a:p>
         </p:txBody>
       </p:sp>
@@ -5950,7 +6976,10 @@
           <a:lstStyle/>
           <a:p>
             <a:pPr algn="ctr"/>
-            <a:endParaRPr lang="en-US"/>
+            <a:r>
+              <a:rPr lang="en-US" sz="4400" b="1" dirty="0"/>
+              <a:t>B</a:t>
+            </a:r>
           </a:p>
         </p:txBody>
       </p:sp>
@@ -6009,7 +7038,7 @@
           <a:lstStyle/>
           <a:p>
             <a:pPr algn="ctr"/>
-            <a:endParaRPr lang="en-US"/>
+            <a:endParaRPr lang="en-US" sz="4400" b="1"/>
           </a:p>
         </p:txBody>
       </p:sp>
@@ -6183,7 +7212,10 @@
           <a:lstStyle/>
           <a:p>
             <a:pPr algn="ctr"/>
-            <a:endParaRPr lang="en-US"/>
+            <a:r>
+              <a:rPr lang="en-US" sz="4400" b="1" dirty="0"/>
+              <a:t>A</a:t>
+            </a:r>
           </a:p>
         </p:txBody>
       </p:sp>
@@ -6242,7 +7274,7 @@
           <a:lstStyle/>
           <a:p>
             <a:pPr algn="ctr"/>
-            <a:endParaRPr lang="en-US"/>
+            <a:endParaRPr lang="en-US" sz="4400" b="1"/>
           </a:p>
         </p:txBody>
       </p:sp>
@@ -6301,7 +7333,7 @@
           <a:lstStyle/>
           <a:p>
             <a:pPr algn="ctr"/>
-            <a:endParaRPr lang="en-US" dirty="0"/>
+            <a:endParaRPr lang="en-US" sz="4400" b="1" dirty="0"/>
           </a:p>
         </p:txBody>
       </p:sp>
@@ -6360,7 +7392,7 @@
           <a:lstStyle/>
           <a:p>
             <a:pPr algn="ctr"/>
-            <a:endParaRPr lang="en-US" dirty="0"/>
+            <a:endParaRPr lang="en-US" sz="4400" b="1" dirty="0"/>
           </a:p>
         </p:txBody>
       </p:sp>
@@ -6418,7 +7450,10 @@
           <a:lstStyle/>
           <a:p>
             <a:pPr algn="ctr"/>
-            <a:endParaRPr lang="en-US"/>
+            <a:r>
+              <a:rPr lang="en-US" sz="4400" b="1" dirty="0"/>
+              <a:t>A</a:t>
+            </a:r>
           </a:p>
         </p:txBody>
       </p:sp>
@@ -6477,7 +7512,7 @@
           <a:lstStyle/>
           <a:p>
             <a:pPr algn="ctr"/>
-            <a:endParaRPr lang="en-US"/>
+            <a:endParaRPr lang="en-US" sz="4400" b="1"/>
           </a:p>
         </p:txBody>
       </p:sp>
@@ -6533,7 +7568,7 @@
           <a:lstStyle/>
           <a:p>
             <a:pPr algn="ctr"/>
-            <a:endParaRPr lang="en-US"/>
+            <a:endParaRPr lang="en-US" sz="4400" b="1"/>
           </a:p>
         </p:txBody>
       </p:sp>
@@ -6553,7 +7588,7 @@
         </p:nvSpPr>
         <p:spPr>
           <a:xfrm>
-            <a:off x="3726477" y="4501235"/>
+            <a:off x="3726477" y="5415635"/>
             <a:ext cx="914400" cy="914400"/>
           </a:xfrm>
           <a:prstGeom prst="rect">
@@ -6592,7 +7627,7 @@
           <a:lstStyle/>
           <a:p>
             <a:pPr algn="ctr"/>
-            <a:endParaRPr lang="en-US" dirty="0"/>
+            <a:endParaRPr lang="en-US" sz="4400" b="1" dirty="0"/>
           </a:p>
         </p:txBody>
       </p:sp>
@@ -6612,7 +7647,7 @@
         </p:nvSpPr>
         <p:spPr>
           <a:xfrm>
-            <a:off x="3726477" y="5415635"/>
+            <a:off x="3726477" y="4501235"/>
             <a:ext cx="914400" cy="914400"/>
           </a:xfrm>
           <a:prstGeom prst="rect">
@@ -6648,7 +7683,7 @@
           <a:lstStyle/>
           <a:p>
             <a:pPr algn="ctr"/>
-            <a:endParaRPr lang="en-US" dirty="0"/>
+            <a:endParaRPr lang="en-US" sz="4400" b="1" dirty="0"/>
           </a:p>
         </p:txBody>
       </p:sp>
@@ -6707,7 +7742,10 @@
           <a:lstStyle/>
           <a:p>
             <a:pPr algn="ctr"/>
-            <a:endParaRPr lang="en-US"/>
+            <a:r>
+              <a:rPr lang="en-US" sz="4400" b="1" dirty="0"/>
+              <a:t>C</a:t>
+            </a:r>
           </a:p>
         </p:txBody>
       </p:sp>
@@ -6767,16 +7805,16 @@
           <a:lstStyle/>
           <a:p>
             <a:pPr algn="ctr"/>
-            <a:endParaRPr lang="en-US" dirty="0"/>
-          </a:p>
-        </p:txBody>
-      </p:sp>
-      <p:sp>
-        <p:nvSpPr>
-          <p:cNvPr id="22" name="Rectangle 21">
-            <a:extLst>
-              <a:ext uri="{FF2B5EF4-FFF2-40B4-BE49-F238E27FC236}">
-                <a16:creationId xmlns:a16="http://schemas.microsoft.com/office/drawing/2014/main" id="{50BDF549-F8B5-233C-B161-F84366FE4016}"/>
+            <a:endParaRPr lang="en-US" sz="4400" b="1" dirty="0"/>
+          </a:p>
+        </p:txBody>
+      </p:sp>
+      <p:sp>
+        <p:nvSpPr>
+          <p:cNvPr id="25" name="Rectangle 24">
+            <a:extLst>
+              <a:ext uri="{FF2B5EF4-FFF2-40B4-BE49-F238E27FC236}">
+                <a16:creationId xmlns:a16="http://schemas.microsoft.com/office/drawing/2014/main" id="{BEAC176A-D38E-6D51-9DDF-7CADF7BB1861}"/>
               </a:ext>
             </a:extLst>
           </p:cNvPr>
@@ -6787,7 +7825,7 @@
         </p:nvSpPr>
         <p:spPr>
           <a:xfrm>
-            <a:off x="8150559" y="4501235"/>
+            <a:off x="7236159" y="3586835"/>
             <a:ext cx="914400" cy="914400"/>
           </a:xfrm>
           <a:prstGeom prst="rect">
@@ -6795,7 +7833,8 @@
           </a:prstGeom>
           <a:solidFill>
             <a:schemeClr val="accent6">
-              <a:alpha val="50000"/>
+              <a:lumMod val="60000"/>
+              <a:lumOff val="40000"/>
             </a:schemeClr>
           </a:solidFill>
           <a:ln w="28575">
@@ -6825,16 +7864,16 @@
           <a:lstStyle/>
           <a:p>
             <a:pPr algn="ctr"/>
-            <a:endParaRPr lang="en-US" dirty="0"/>
-          </a:p>
-        </p:txBody>
-      </p:sp>
-      <p:sp>
-        <p:nvSpPr>
-          <p:cNvPr id="25" name="Rectangle 24">
-            <a:extLst>
-              <a:ext uri="{FF2B5EF4-FFF2-40B4-BE49-F238E27FC236}">
-                <a16:creationId xmlns:a16="http://schemas.microsoft.com/office/drawing/2014/main" id="{BEAC176A-D38E-6D51-9DDF-7CADF7BB1861}"/>
+            <a:endParaRPr lang="en-US" sz="4400" b="1"/>
+          </a:p>
+        </p:txBody>
+      </p:sp>
+      <p:sp>
+        <p:nvSpPr>
+          <p:cNvPr id="26" name="Rectangle 25">
+            <a:extLst>
+              <a:ext uri="{FF2B5EF4-FFF2-40B4-BE49-F238E27FC236}">
+                <a16:creationId xmlns:a16="http://schemas.microsoft.com/office/drawing/2014/main" id="{35866720-3964-1B90-EBDB-00D458EC7689}"/>
               </a:ext>
             </a:extLst>
           </p:cNvPr>
@@ -6845,17 +7884,14 @@
         </p:nvSpPr>
         <p:spPr>
           <a:xfrm>
-            <a:off x="7236159" y="3586835"/>
+            <a:off x="7236159" y="4501235"/>
             <a:ext cx="914400" cy="914400"/>
           </a:xfrm>
           <a:prstGeom prst="rect">
             <a:avLst/>
           </a:prstGeom>
           <a:solidFill>
-            <a:schemeClr val="accent6">
-              <a:lumMod val="60000"/>
-              <a:lumOff val="40000"/>
-            </a:schemeClr>
+            <a:schemeClr val="accent6"/>
           </a:solidFill>
           <a:ln w="28575">
             <a:solidFill>
@@ -6884,38 +7920,36 @@
           <a:lstStyle/>
           <a:p>
             <a:pPr algn="ctr"/>
-            <a:endParaRPr lang="en-US"/>
-          </a:p>
-        </p:txBody>
-      </p:sp>
-      <p:sp>
-        <p:nvSpPr>
-          <p:cNvPr id="26" name="Rectangle 25">
-            <a:extLst>
-              <a:ext uri="{FF2B5EF4-FFF2-40B4-BE49-F238E27FC236}">
-                <a16:creationId xmlns:a16="http://schemas.microsoft.com/office/drawing/2014/main" id="{35866720-3964-1B90-EBDB-00D458EC7689}"/>
-              </a:ext>
-            </a:extLst>
-          </p:cNvPr>
-          <p:cNvSpPr>
-            <a:spLocks noChangeAspect="1"/>
-          </p:cNvSpPr>
-          <p:nvPr/>
-        </p:nvSpPr>
-        <p:spPr>
-          <a:xfrm>
-            <a:off x="7236159" y="4501235"/>
-            <a:ext cx="914400" cy="914400"/>
-          </a:xfrm>
-          <a:prstGeom prst="rect">
+            <a:endParaRPr lang="en-US" sz="4400" b="1"/>
+          </a:p>
+        </p:txBody>
+      </p:sp>
+      <p:sp>
+        <p:nvSpPr>
+          <p:cNvPr id="4" name="Triangle 3">
+            <a:extLst>
+              <a:ext uri="{FF2B5EF4-FFF2-40B4-BE49-F238E27FC236}">
+                <a16:creationId xmlns:a16="http://schemas.microsoft.com/office/drawing/2014/main" id="{E60CAFDD-4B11-1009-593E-EEFBDB8151EB}"/>
+              </a:ext>
+            </a:extLst>
+          </p:cNvPr>
+          <p:cNvSpPr/>
+          <p:nvPr/>
+        </p:nvSpPr>
+        <p:spPr>
+          <a:xfrm rot="10800000">
+            <a:off x="3909357" y="2913137"/>
+            <a:ext cx="548640" cy="457200"/>
+          </a:xfrm>
+          <a:prstGeom prst="triangle">
             <a:avLst/>
           </a:prstGeom>
-          <a:solidFill>
-            <a:schemeClr val="accent6"/>
-          </a:solidFill>
+          <a:noFill/>
           <a:ln w="28575">
             <a:solidFill>
-              <a:schemeClr val="bg1"/>
+              <a:schemeClr val="accent6">
+                <a:lumMod val="75000"/>
+              </a:schemeClr>
             </a:solidFill>
           </a:ln>
         </p:spPr>
@@ -6941,6 +7975,351 @@
           <a:p>
             <a:pPr algn="ctr"/>
             <a:endParaRPr lang="en-US"/>
+          </a:p>
+        </p:txBody>
+      </p:sp>
+      <p:sp>
+        <p:nvSpPr>
+          <p:cNvPr id="8" name="Hexagon 7">
+            <a:extLst>
+              <a:ext uri="{FF2B5EF4-FFF2-40B4-BE49-F238E27FC236}">
+                <a16:creationId xmlns:a16="http://schemas.microsoft.com/office/drawing/2014/main" id="{8045994B-9E32-DAED-EAA5-E1A1AFD80A6D}"/>
+              </a:ext>
+            </a:extLst>
+          </p:cNvPr>
+          <p:cNvSpPr>
+            <a:spLocks noChangeAspect="1"/>
+          </p:cNvSpPr>
+          <p:nvPr/>
+        </p:nvSpPr>
+        <p:spPr>
+          <a:xfrm rot="5400000">
+            <a:off x="3862060" y="3768139"/>
+            <a:ext cx="640080" cy="551793"/>
+          </a:xfrm>
+          <a:prstGeom prst="hexagon">
+            <a:avLst>
+              <a:gd name="adj" fmla="val 35104"/>
+              <a:gd name="vf" fmla="val 115470"/>
+            </a:avLst>
+          </a:prstGeom>
+          <a:noFill/>
+          <a:ln w="28575">
+            <a:solidFill>
+              <a:schemeClr val="accent6">
+                <a:lumMod val="75000"/>
+              </a:schemeClr>
+            </a:solidFill>
+          </a:ln>
+        </p:spPr>
+        <p:style>
+          <a:lnRef idx="2">
+            <a:schemeClr val="accent1">
+              <a:shade val="50000"/>
+            </a:schemeClr>
+          </a:lnRef>
+          <a:fillRef idx="1">
+            <a:schemeClr val="accent1"/>
+          </a:fillRef>
+          <a:effectRef idx="0">
+            <a:schemeClr val="accent1"/>
+          </a:effectRef>
+          <a:fontRef idx="minor">
+            <a:schemeClr val="lt1"/>
+          </a:fontRef>
+        </p:style>
+        <p:txBody>
+          <a:bodyPr rtlCol="0" anchor="ctr"/>
+          <a:lstStyle/>
+          <a:p>
+            <a:pPr algn="ctr"/>
+            <a:endParaRPr lang="en-US"/>
+          </a:p>
+        </p:txBody>
+      </p:sp>
+      <p:sp>
+        <p:nvSpPr>
+          <p:cNvPr id="24" name="Triangle 23">
+            <a:extLst>
+              <a:ext uri="{FF2B5EF4-FFF2-40B4-BE49-F238E27FC236}">
+                <a16:creationId xmlns:a16="http://schemas.microsoft.com/office/drawing/2014/main" id="{B1D86AF9-20A0-3BED-A679-7E9E9A104061}"/>
+              </a:ext>
+            </a:extLst>
+          </p:cNvPr>
+          <p:cNvSpPr/>
+          <p:nvPr/>
+        </p:nvSpPr>
+        <p:spPr>
+          <a:xfrm rot="10800000">
+            <a:off x="7420616" y="3841682"/>
+            <a:ext cx="548640" cy="457200"/>
+          </a:xfrm>
+          <a:prstGeom prst="triangle">
+            <a:avLst/>
+          </a:prstGeom>
+          <a:noFill/>
+          <a:ln w="28575">
+            <a:solidFill>
+              <a:schemeClr val="accent6">
+                <a:lumMod val="75000"/>
+              </a:schemeClr>
+            </a:solidFill>
+          </a:ln>
+        </p:spPr>
+        <p:style>
+          <a:lnRef idx="2">
+            <a:schemeClr val="accent1">
+              <a:shade val="50000"/>
+            </a:schemeClr>
+          </a:lnRef>
+          <a:fillRef idx="1">
+            <a:schemeClr val="accent1"/>
+          </a:fillRef>
+          <a:effectRef idx="0">
+            <a:schemeClr val="accent1"/>
+          </a:effectRef>
+          <a:fontRef idx="minor">
+            <a:schemeClr val="lt1"/>
+          </a:fontRef>
+        </p:style>
+        <p:txBody>
+          <a:bodyPr rtlCol="0" anchor="ctr"/>
+          <a:lstStyle/>
+          <a:p>
+            <a:pPr algn="ctr"/>
+            <a:endParaRPr lang="en-US"/>
+          </a:p>
+        </p:txBody>
+      </p:sp>
+      <p:sp>
+        <p:nvSpPr>
+          <p:cNvPr id="27" name="Hexagon 26">
+            <a:extLst>
+              <a:ext uri="{FF2B5EF4-FFF2-40B4-BE49-F238E27FC236}">
+                <a16:creationId xmlns:a16="http://schemas.microsoft.com/office/drawing/2014/main" id="{A3517C2D-175E-9FD4-7C70-383F37ABBC0E}"/>
+              </a:ext>
+            </a:extLst>
+          </p:cNvPr>
+          <p:cNvSpPr>
+            <a:spLocks noChangeAspect="1"/>
+          </p:cNvSpPr>
+          <p:nvPr/>
+        </p:nvSpPr>
+        <p:spPr>
+          <a:xfrm rot="5400000">
+            <a:off x="7373319" y="4696684"/>
+            <a:ext cx="640080" cy="551793"/>
+          </a:xfrm>
+          <a:prstGeom prst="hexagon">
+            <a:avLst>
+              <a:gd name="adj" fmla="val 35104"/>
+              <a:gd name="vf" fmla="val 115470"/>
+            </a:avLst>
+          </a:prstGeom>
+          <a:noFill/>
+          <a:ln w="28575">
+            <a:solidFill>
+              <a:schemeClr val="accent6">
+                <a:lumMod val="75000"/>
+              </a:schemeClr>
+            </a:solidFill>
+          </a:ln>
+        </p:spPr>
+        <p:style>
+          <a:lnRef idx="2">
+            <a:schemeClr val="accent1">
+              <a:shade val="50000"/>
+            </a:schemeClr>
+          </a:lnRef>
+          <a:fillRef idx="1">
+            <a:schemeClr val="accent1"/>
+          </a:fillRef>
+          <a:effectRef idx="0">
+            <a:schemeClr val="accent1"/>
+          </a:effectRef>
+          <a:fontRef idx="minor">
+            <a:schemeClr val="lt1"/>
+          </a:fontRef>
+        </p:style>
+        <p:txBody>
+          <a:bodyPr rtlCol="0" anchor="ctr"/>
+          <a:lstStyle/>
+          <a:p>
+            <a:pPr algn="ctr"/>
+            <a:endParaRPr lang="en-US"/>
+          </a:p>
+        </p:txBody>
+      </p:sp>
+      <p:sp>
+        <p:nvSpPr>
+          <p:cNvPr id="28" name="Hexagon 27">
+            <a:extLst>
+              <a:ext uri="{FF2B5EF4-FFF2-40B4-BE49-F238E27FC236}">
+                <a16:creationId xmlns:a16="http://schemas.microsoft.com/office/drawing/2014/main" id="{9AAD0543-09C6-23E2-FA72-B57252DE64FD}"/>
+              </a:ext>
+            </a:extLst>
+          </p:cNvPr>
+          <p:cNvSpPr>
+            <a:spLocks noChangeAspect="1"/>
+          </p:cNvSpPr>
+          <p:nvPr/>
+        </p:nvSpPr>
+        <p:spPr>
+          <a:xfrm rot="5400000">
+            <a:off x="3862059" y="4682540"/>
+            <a:ext cx="640080" cy="551793"/>
+          </a:xfrm>
+          <a:prstGeom prst="hexagon">
+            <a:avLst>
+              <a:gd name="adj" fmla="val 35104"/>
+              <a:gd name="vf" fmla="val 115470"/>
+            </a:avLst>
+          </a:prstGeom>
+          <a:noFill/>
+          <a:ln w="28575">
+            <a:solidFill>
+              <a:schemeClr val="accent6">
+                <a:lumMod val="75000"/>
+              </a:schemeClr>
+            </a:solidFill>
+          </a:ln>
+        </p:spPr>
+        <p:style>
+          <a:lnRef idx="2">
+            <a:schemeClr val="accent1">
+              <a:shade val="50000"/>
+            </a:schemeClr>
+          </a:lnRef>
+          <a:fillRef idx="1">
+            <a:schemeClr val="accent1"/>
+          </a:fillRef>
+          <a:effectRef idx="0">
+            <a:schemeClr val="accent1"/>
+          </a:effectRef>
+          <a:fontRef idx="minor">
+            <a:schemeClr val="lt1"/>
+          </a:fontRef>
+        </p:style>
+        <p:txBody>
+          <a:bodyPr rtlCol="0" anchor="ctr"/>
+          <a:lstStyle/>
+          <a:p>
+            <a:pPr algn="ctr"/>
+            <a:endParaRPr lang="en-US"/>
+          </a:p>
+        </p:txBody>
+      </p:sp>
+      <p:sp>
+        <p:nvSpPr>
+          <p:cNvPr id="29" name="Triangle 28">
+            <a:extLst>
+              <a:ext uri="{FF2B5EF4-FFF2-40B4-BE49-F238E27FC236}">
+                <a16:creationId xmlns:a16="http://schemas.microsoft.com/office/drawing/2014/main" id="{A065DAA6-A917-FF10-0AD9-CD459060C5D5}"/>
+              </a:ext>
+            </a:extLst>
+          </p:cNvPr>
+          <p:cNvSpPr/>
+          <p:nvPr/>
+        </p:nvSpPr>
+        <p:spPr>
+          <a:xfrm rot="10800000">
+            <a:off x="3906202" y="5658424"/>
+            <a:ext cx="548640" cy="457200"/>
+          </a:xfrm>
+          <a:prstGeom prst="triangle">
+            <a:avLst/>
+          </a:prstGeom>
+          <a:noFill/>
+          <a:ln w="28575">
+            <a:solidFill>
+              <a:schemeClr val="accent6">
+                <a:lumMod val="75000"/>
+              </a:schemeClr>
+            </a:solidFill>
+          </a:ln>
+        </p:spPr>
+        <p:style>
+          <a:lnRef idx="2">
+            <a:schemeClr val="accent1">
+              <a:shade val="50000"/>
+            </a:schemeClr>
+          </a:lnRef>
+          <a:fillRef idx="1">
+            <a:schemeClr val="accent1"/>
+          </a:fillRef>
+          <a:effectRef idx="0">
+            <a:schemeClr val="accent1"/>
+          </a:effectRef>
+          <a:fontRef idx="minor">
+            <a:schemeClr val="lt1"/>
+          </a:fontRef>
+        </p:style>
+        <p:txBody>
+          <a:bodyPr rtlCol="0" anchor="ctr"/>
+          <a:lstStyle/>
+          <a:p>
+            <a:pPr algn="ctr"/>
+            <a:endParaRPr lang="en-US"/>
+          </a:p>
+        </p:txBody>
+      </p:sp>
+      <p:sp>
+        <p:nvSpPr>
+          <p:cNvPr id="31" name="Rectangle 30">
+            <a:extLst>
+              <a:ext uri="{FF2B5EF4-FFF2-40B4-BE49-F238E27FC236}">
+                <a16:creationId xmlns:a16="http://schemas.microsoft.com/office/drawing/2014/main" id="{48ACC701-9022-DCBF-2934-BE2D6C3CC2EA}"/>
+              </a:ext>
+            </a:extLst>
+          </p:cNvPr>
+          <p:cNvSpPr>
+            <a:spLocks noChangeAspect="1"/>
+          </p:cNvSpPr>
+          <p:nvPr/>
+        </p:nvSpPr>
+        <p:spPr>
+          <a:xfrm>
+            <a:off x="8150559" y="4501235"/>
+            <a:ext cx="914400" cy="914400"/>
+          </a:xfrm>
+          <a:prstGeom prst="rect">
+            <a:avLst/>
+          </a:prstGeom>
+          <a:solidFill>
+            <a:schemeClr val="accent6">
+              <a:lumMod val="60000"/>
+              <a:lumOff val="40000"/>
+              <a:alpha val="50000"/>
+            </a:schemeClr>
+          </a:solidFill>
+          <a:ln w="28575">
+            <a:solidFill>
+              <a:schemeClr val="bg1"/>
+            </a:solidFill>
+          </a:ln>
+        </p:spPr>
+        <p:style>
+          <a:lnRef idx="2">
+            <a:schemeClr val="accent1">
+              <a:shade val="50000"/>
+            </a:schemeClr>
+          </a:lnRef>
+          <a:fillRef idx="1">
+            <a:schemeClr val="accent1"/>
+          </a:fillRef>
+          <a:effectRef idx="0">
+            <a:schemeClr val="accent1"/>
+          </a:effectRef>
+          <a:fontRef idx="minor">
+            <a:schemeClr val="lt1"/>
+          </a:fontRef>
+        </p:style>
+        <p:txBody>
+          <a:bodyPr rtlCol="0" anchor="ctr"/>
+          <a:lstStyle/>
+          <a:p>
+            <a:pPr algn="ctr"/>
+            <a:endParaRPr lang="en-US" sz="4400" b="1" dirty="0"/>
           </a:p>
         </p:txBody>
       </p:sp>
@@ -10962,7 +12341,7 @@
             <a:pPr algn="ctr"/>
             <a:r>
               <a:rPr lang="en-US" sz="3200" b="1" dirty="0"/>
-              <a:t>Joining: Outer Join</a:t>
+              <a:t>Joining: Full Join</a:t>
             </a:r>
           </a:p>
         </p:txBody>
@@ -12222,7 +13601,7 @@
           <p:cNvPr id="5" name="Rectangle 4">
             <a:extLst>
               <a:ext uri="{FF2B5EF4-FFF2-40B4-BE49-F238E27FC236}">
-                <a16:creationId xmlns:a16="http://schemas.microsoft.com/office/drawing/2014/main" id="{01F4FA83-0791-ABF4-2495-25FB6E73359D}"/>
+                <a16:creationId xmlns:a16="http://schemas.microsoft.com/office/drawing/2014/main" id="{BB106441-45AC-62EA-DFF6-B9C0DA75D1A3}"/>
               </a:ext>
             </a:extLst>
           </p:cNvPr>
@@ -12234,13 +13613,13 @@
         <p:spPr>
           <a:xfrm>
             <a:off x="-1" y="0"/>
-            <a:ext cx="4733366" cy="914400"/>
+            <a:ext cx="4613984" cy="914400"/>
           </a:xfrm>
           <a:prstGeom prst="rect">
             <a:avLst/>
           </a:prstGeom>
           <a:solidFill>
-            <a:schemeClr val="accent4"/>
+            <a:schemeClr val="accent1"/>
           </a:solidFill>
           <a:ln w="28575">
             <a:solidFill>
@@ -12271,40 +13650,43 @@
             <a:pPr algn="ctr"/>
             <a:r>
               <a:rPr lang="en-US" sz="3200" b="1" dirty="0"/>
-              <a:t>Reshaping: Pivot Longer </a:t>
+              <a:t>Joining: Anti Join</a:t>
             </a:r>
           </a:p>
         </p:txBody>
       </p:sp>
       <p:sp>
         <p:nvSpPr>
-          <p:cNvPr id="6" name="Right Arrow 5">
-            <a:extLst>
-              <a:ext uri="{FF2B5EF4-FFF2-40B4-BE49-F238E27FC236}">
-                <a16:creationId xmlns:a16="http://schemas.microsoft.com/office/drawing/2014/main" id="{2E2BA415-57C2-4ABA-2DF2-70857FFA5565}"/>
-              </a:ext>
-            </a:extLst>
-          </p:cNvPr>
-          <p:cNvSpPr/>
-          <p:nvPr/>
-        </p:nvSpPr>
-        <p:spPr>
-          <a:xfrm>
-            <a:off x="5548553" y="3364097"/>
-            <a:ext cx="914400" cy="524435"/>
-          </a:xfrm>
-          <a:prstGeom prst="rightArrow">
+          <p:cNvPr id="52" name="Rectangle 51">
+            <a:extLst>
+              <a:ext uri="{FF2B5EF4-FFF2-40B4-BE49-F238E27FC236}">
+                <a16:creationId xmlns:a16="http://schemas.microsoft.com/office/drawing/2014/main" id="{B0A5C352-5DE4-FEA0-8FAD-F9F7B6D77A26}"/>
+              </a:ext>
+            </a:extLst>
+          </p:cNvPr>
+          <p:cNvSpPr>
+            <a:spLocks noChangeAspect="1"/>
+          </p:cNvSpPr>
+          <p:nvPr/>
+        </p:nvSpPr>
+        <p:spPr>
+          <a:xfrm>
+            <a:off x="5776407" y="3442510"/>
+            <a:ext cx="914400" cy="914400"/>
+          </a:xfrm>
+          <a:prstGeom prst="rect">
             <a:avLst/>
           </a:prstGeom>
           <a:solidFill>
-            <a:schemeClr val="tx2">
-              <a:lumMod val="40000"/>
-              <a:lumOff val="60000"/>
+            <a:schemeClr val="accent1">
+              <a:lumMod val="20000"/>
+              <a:lumOff val="80000"/>
+              <a:alpha val="60000"/>
             </a:schemeClr>
           </a:solidFill>
           <a:ln w="28575">
             <a:solidFill>
-              <a:schemeClr val="tx2"/>
+              <a:schemeClr val="bg1"/>
             </a:solidFill>
           </a:ln>
         </p:spPr>
@@ -12329,16 +13711,16 @@
           <a:lstStyle/>
           <a:p>
             <a:pPr algn="ctr"/>
-            <a:endParaRPr lang="en-US"/>
-          </a:p>
-        </p:txBody>
-      </p:sp>
-      <p:sp>
-        <p:nvSpPr>
-          <p:cNvPr id="7" name="Rectangle 6">
-            <a:extLst>
-              <a:ext uri="{FF2B5EF4-FFF2-40B4-BE49-F238E27FC236}">
-                <a16:creationId xmlns:a16="http://schemas.microsoft.com/office/drawing/2014/main" id="{1BE21053-4CD6-953A-7B7D-048B4AD0D53A}"/>
+            <a:endParaRPr lang="en-US" sz="4400" b="1" dirty="0"/>
+          </a:p>
+        </p:txBody>
+      </p:sp>
+      <p:sp>
+        <p:nvSpPr>
+          <p:cNvPr id="53" name="Rectangle 52">
+            <a:extLst>
+              <a:ext uri="{FF2B5EF4-FFF2-40B4-BE49-F238E27FC236}">
+                <a16:creationId xmlns:a16="http://schemas.microsoft.com/office/drawing/2014/main" id="{6A8AD78B-EB44-B74C-9DB3-AB0F00E8226B}"/>
               </a:ext>
             </a:extLst>
           </p:cNvPr>
@@ -12349,14 +13731,18 @@
         </p:nvSpPr>
         <p:spPr>
           <a:xfrm>
-            <a:off x="6850376" y="2254715"/>
+            <a:off x="5776407" y="4356910"/>
             <a:ext cx="914400" cy="914400"/>
           </a:xfrm>
           <a:prstGeom prst="rect">
             <a:avLst/>
           </a:prstGeom>
           <a:solidFill>
-            <a:schemeClr val="accent4"/>
+            <a:schemeClr val="accent1">
+              <a:lumMod val="20000"/>
+              <a:lumOff val="80000"/>
+              <a:alpha val="60000"/>
+            </a:schemeClr>
           </a:solidFill>
           <a:ln w="28575">
             <a:solidFill>
@@ -12385,40 +13771,39 @@
           <a:lstStyle/>
           <a:p>
             <a:pPr algn="ctr"/>
-            <a:endParaRPr lang="en-US"/>
-          </a:p>
-        </p:txBody>
-      </p:sp>
-      <p:sp>
-        <p:nvSpPr>
-          <p:cNvPr id="9" name="Rectangle 8">
-            <a:extLst>
-              <a:ext uri="{FF2B5EF4-FFF2-40B4-BE49-F238E27FC236}">
-                <a16:creationId xmlns:a16="http://schemas.microsoft.com/office/drawing/2014/main" id="{B25364AF-F4B4-A6BB-CA44-15A4671FFC87}"/>
-              </a:ext>
-            </a:extLst>
-          </p:cNvPr>
-          <p:cNvSpPr>
-            <a:spLocks noChangeAspect="1"/>
-          </p:cNvSpPr>
-          <p:nvPr/>
-        </p:nvSpPr>
-        <p:spPr>
-          <a:xfrm>
-            <a:off x="4246730" y="2711915"/>
-            <a:ext cx="914400" cy="914400"/>
-          </a:xfrm>
-          <a:prstGeom prst="rect">
+            <a:endParaRPr lang="en-US" sz="4400" b="1"/>
+          </a:p>
+        </p:txBody>
+      </p:sp>
+      <p:sp>
+        <p:nvSpPr>
+          <p:cNvPr id="54" name="Right Arrow 53">
+            <a:extLst>
+              <a:ext uri="{FF2B5EF4-FFF2-40B4-BE49-F238E27FC236}">
+                <a16:creationId xmlns:a16="http://schemas.microsoft.com/office/drawing/2014/main" id="{96BA198C-AF34-DAFB-8B28-1917B53319C3}"/>
+              </a:ext>
+            </a:extLst>
+          </p:cNvPr>
+          <p:cNvSpPr/>
+          <p:nvPr/>
+        </p:nvSpPr>
+        <p:spPr>
+          <a:xfrm>
+            <a:off x="7074048" y="3972204"/>
+            <a:ext cx="914400" cy="524435"/>
+          </a:xfrm>
+          <a:prstGeom prst="rightArrow">
             <a:avLst/>
           </a:prstGeom>
           <a:solidFill>
-            <a:schemeClr val="accent4">
-              <a:lumMod val="50000"/>
+            <a:schemeClr val="tx2">
+              <a:lumMod val="40000"/>
+              <a:lumOff val="60000"/>
             </a:schemeClr>
           </a:solidFill>
           <a:ln w="28575">
             <a:solidFill>
-              <a:schemeClr val="bg1"/>
+              <a:schemeClr val="tx2"/>
             </a:solidFill>
           </a:ln>
         </p:spPr>
@@ -12449,10 +13834,10 @@
       </p:sp>
       <p:sp>
         <p:nvSpPr>
-          <p:cNvPr id="10" name="Rectangle 9">
-            <a:extLst>
-              <a:ext uri="{FF2B5EF4-FFF2-40B4-BE49-F238E27FC236}">
-                <a16:creationId xmlns:a16="http://schemas.microsoft.com/office/drawing/2014/main" id="{9685F398-8909-B531-2109-22EBC59413B5}"/>
+          <p:cNvPr id="55" name="Cross 54">
+            <a:extLst>
+              <a:ext uri="{FF2B5EF4-FFF2-40B4-BE49-F238E27FC236}">
+                <a16:creationId xmlns:a16="http://schemas.microsoft.com/office/drawing/2014/main" id="{0FF6A6C6-8519-7357-527C-872DDC5C6806}"/>
               </a:ext>
             </a:extLst>
           </p:cNvPr>
@@ -12463,21 +13848,23 @@
         </p:nvSpPr>
         <p:spPr>
           <a:xfrm>
-            <a:off x="4246730" y="3626315"/>
-            <a:ext cx="914400" cy="914400"/>
-          </a:xfrm>
-          <a:prstGeom prst="rect">
-            <a:avLst/>
-          </a:prstGeom>
-          <a:solidFill>
-            <a:schemeClr val="accent4">
+            <a:off x="3792966" y="3972204"/>
+            <a:ext cx="685800" cy="685800"/>
+          </a:xfrm>
+          <a:prstGeom prst="plus">
+            <a:avLst>
+              <a:gd name="adj" fmla="val 31372"/>
+            </a:avLst>
+          </a:prstGeom>
+          <a:solidFill>
+            <a:schemeClr val="tx2">
               <a:lumMod val="40000"/>
               <a:lumOff val="60000"/>
             </a:schemeClr>
           </a:solidFill>
           <a:ln w="28575">
             <a:solidFill>
-              <a:schemeClr val="bg1"/>
+              <a:schemeClr val="tx2"/>
             </a:solidFill>
           </a:ln>
         </p:spPr>
@@ -12508,10 +13895,10 @@
       </p:sp>
       <p:sp>
         <p:nvSpPr>
-          <p:cNvPr id="11" name="Rectangle 10">
-            <a:extLst>
-              <a:ext uri="{FF2B5EF4-FFF2-40B4-BE49-F238E27FC236}">
-                <a16:creationId xmlns:a16="http://schemas.microsoft.com/office/drawing/2014/main" id="{AEE4741C-8ECE-8AA6-1084-01054448B958}"/>
+          <p:cNvPr id="56" name="Rectangle 55">
+            <a:extLst>
+              <a:ext uri="{FF2B5EF4-FFF2-40B4-BE49-F238E27FC236}">
+                <a16:creationId xmlns:a16="http://schemas.microsoft.com/office/drawing/2014/main" id="{51F6BABD-D511-1278-F2C9-ECF15C54F246}"/>
               </a:ext>
             </a:extLst>
           </p:cNvPr>
@@ -12522,14 +13909,14 @@
         </p:nvSpPr>
         <p:spPr>
           <a:xfrm>
-            <a:off x="3332330" y="2711915"/>
+            <a:off x="4862007" y="3442510"/>
             <a:ext cx="914400" cy="914400"/>
           </a:xfrm>
           <a:prstGeom prst="rect">
             <a:avLst/>
           </a:prstGeom>
           <a:solidFill>
-            <a:schemeClr val="accent4">
+            <a:schemeClr val="accent1">
               <a:lumMod val="75000"/>
             </a:schemeClr>
           </a:solidFill>
@@ -12560,16 +13947,19 @@
           <a:lstStyle/>
           <a:p>
             <a:pPr algn="ctr"/>
-            <a:endParaRPr lang="en-US"/>
-          </a:p>
-        </p:txBody>
-      </p:sp>
-      <p:sp>
-        <p:nvSpPr>
-          <p:cNvPr id="12" name="Rectangle 11">
-            <a:extLst>
-              <a:ext uri="{FF2B5EF4-FFF2-40B4-BE49-F238E27FC236}">
-                <a16:creationId xmlns:a16="http://schemas.microsoft.com/office/drawing/2014/main" id="{BDE39744-B92C-486F-52A9-63B3C01D97A0}"/>
+            <a:r>
+              <a:rPr lang="en-US" sz="4400" b="1" dirty="0"/>
+              <a:t>A</a:t>
+            </a:r>
+          </a:p>
+        </p:txBody>
+      </p:sp>
+      <p:sp>
+        <p:nvSpPr>
+          <p:cNvPr id="57" name="Rectangle 56">
+            <a:extLst>
+              <a:ext uri="{FF2B5EF4-FFF2-40B4-BE49-F238E27FC236}">
+                <a16:creationId xmlns:a16="http://schemas.microsoft.com/office/drawing/2014/main" id="{E21E4AA9-FF98-D476-61F0-281A3BFBE8FA}"/>
               </a:ext>
             </a:extLst>
           </p:cNvPr>
@@ -12580,16 +13970,15 @@
         </p:nvSpPr>
         <p:spPr>
           <a:xfrm>
-            <a:off x="3332330" y="3626315"/>
+            <a:off x="4862007" y="4356910"/>
             <a:ext cx="914400" cy="914400"/>
           </a:xfrm>
           <a:prstGeom prst="rect">
             <a:avLst/>
           </a:prstGeom>
           <a:solidFill>
-            <a:schemeClr val="accent4">
-              <a:lumMod val="40000"/>
-              <a:lumOff val="60000"/>
+            <a:schemeClr val="accent1">
+              <a:lumMod val="50000"/>
             </a:schemeClr>
           </a:solidFill>
           <a:ln w="28575">
@@ -12619,16 +14008,19 @@
           <a:lstStyle/>
           <a:p>
             <a:pPr algn="ctr"/>
-            <a:endParaRPr lang="en-US"/>
-          </a:p>
-        </p:txBody>
-      </p:sp>
-      <p:sp>
-        <p:nvSpPr>
-          <p:cNvPr id="16" name="Rectangle 15">
-            <a:extLst>
-              <a:ext uri="{FF2B5EF4-FFF2-40B4-BE49-F238E27FC236}">
-                <a16:creationId xmlns:a16="http://schemas.microsoft.com/office/drawing/2014/main" id="{3EC4D57C-0440-BF33-11A6-840A3DED1E90}"/>
+            <a:r>
+              <a:rPr lang="en-US" sz="4400" b="1" dirty="0"/>
+              <a:t>C</a:t>
+            </a:r>
+          </a:p>
+        </p:txBody>
+      </p:sp>
+      <p:sp>
+        <p:nvSpPr>
+          <p:cNvPr id="58" name="Rectangle 57">
+            <a:extLst>
+              <a:ext uri="{FF2B5EF4-FFF2-40B4-BE49-F238E27FC236}">
+                <a16:creationId xmlns:a16="http://schemas.microsoft.com/office/drawing/2014/main" id="{372DBE53-A487-D5E3-A3CB-A6DBFEA52D02}"/>
               </a:ext>
             </a:extLst>
           </p:cNvPr>
@@ -12639,16 +14031,17 @@
         </p:nvSpPr>
         <p:spPr>
           <a:xfrm>
-            <a:off x="7760593" y="2254715"/>
+            <a:off x="2495325" y="3442510"/>
             <a:ext cx="914400" cy="914400"/>
           </a:xfrm>
           <a:prstGeom prst="rect">
             <a:avLst/>
           </a:prstGeom>
           <a:solidFill>
-            <a:schemeClr val="accent4">
-              <a:lumMod val="60000"/>
-              <a:lumOff val="40000"/>
+            <a:schemeClr val="accent1">
+              <a:lumMod val="40000"/>
+              <a:lumOff val="60000"/>
+              <a:alpha val="80000"/>
             </a:schemeClr>
           </a:solidFill>
           <a:ln w="28575">
@@ -12678,16 +14071,16 @@
           <a:lstStyle/>
           <a:p>
             <a:pPr algn="ctr"/>
-            <a:endParaRPr lang="en-US"/>
-          </a:p>
-        </p:txBody>
-      </p:sp>
-      <p:sp>
-        <p:nvSpPr>
-          <p:cNvPr id="17" name="Rectangle 16">
-            <a:extLst>
-              <a:ext uri="{FF2B5EF4-FFF2-40B4-BE49-F238E27FC236}">
-                <a16:creationId xmlns:a16="http://schemas.microsoft.com/office/drawing/2014/main" id="{7F4CF8F8-4023-9F8A-D4A3-5E4399790904}"/>
+            <a:endParaRPr lang="en-US" sz="4400" b="1"/>
+          </a:p>
+        </p:txBody>
+      </p:sp>
+      <p:sp>
+        <p:nvSpPr>
+          <p:cNvPr id="59" name="Rectangle 58">
+            <a:extLst>
+              <a:ext uri="{FF2B5EF4-FFF2-40B4-BE49-F238E27FC236}">
+                <a16:creationId xmlns:a16="http://schemas.microsoft.com/office/drawing/2014/main" id="{1FD01FCB-1C34-C193-1679-762F382E21C4}"/>
               </a:ext>
             </a:extLst>
           </p:cNvPr>
@@ -12698,15 +14091,17 @@
         </p:nvSpPr>
         <p:spPr>
           <a:xfrm>
-            <a:off x="6850376" y="4083515"/>
+            <a:off x="2495325" y="4356910"/>
             <a:ext cx="914400" cy="914400"/>
           </a:xfrm>
           <a:prstGeom prst="rect">
             <a:avLst/>
           </a:prstGeom>
           <a:solidFill>
-            <a:schemeClr val="accent4">
-              <a:lumMod val="50000"/>
+            <a:schemeClr val="accent1">
+              <a:lumMod val="40000"/>
+              <a:lumOff val="60000"/>
+              <a:alpha val="80000"/>
             </a:schemeClr>
           </a:solidFill>
           <a:ln w="28575">
@@ -12736,16 +14131,16 @@
           <a:lstStyle/>
           <a:p>
             <a:pPr algn="ctr"/>
-            <a:endParaRPr lang="en-US"/>
-          </a:p>
-        </p:txBody>
-      </p:sp>
-      <p:sp>
-        <p:nvSpPr>
-          <p:cNvPr id="18" name="Rectangle 17">
-            <a:extLst>
-              <a:ext uri="{FF2B5EF4-FFF2-40B4-BE49-F238E27FC236}">
-                <a16:creationId xmlns:a16="http://schemas.microsoft.com/office/drawing/2014/main" id="{7923B18E-31C4-6DB5-13A7-161463AA7A90}"/>
+            <a:endParaRPr lang="en-US" sz="4400" b="1"/>
+          </a:p>
+        </p:txBody>
+      </p:sp>
+      <p:sp>
+        <p:nvSpPr>
+          <p:cNvPr id="60" name="Rectangle 59">
+            <a:extLst>
+              <a:ext uri="{FF2B5EF4-FFF2-40B4-BE49-F238E27FC236}">
+                <a16:creationId xmlns:a16="http://schemas.microsoft.com/office/drawing/2014/main" id="{90D800EC-EED6-E1A2-8FEE-17495A4D917E}"/>
               </a:ext>
             </a:extLst>
           </p:cNvPr>
@@ -12756,14 +14151,14 @@
         </p:nvSpPr>
         <p:spPr>
           <a:xfrm>
-            <a:off x="6850376" y="3169115"/>
+            <a:off x="1580925" y="3442510"/>
             <a:ext cx="914400" cy="914400"/>
           </a:xfrm>
           <a:prstGeom prst="rect">
             <a:avLst/>
           </a:prstGeom>
           <a:solidFill>
-            <a:schemeClr val="accent4">
+            <a:schemeClr val="accent1">
               <a:lumMod val="75000"/>
             </a:schemeClr>
           </a:solidFill>
@@ -12794,16 +14189,19 @@
           <a:lstStyle/>
           <a:p>
             <a:pPr algn="ctr"/>
-            <a:endParaRPr lang="en-US"/>
-          </a:p>
-        </p:txBody>
-      </p:sp>
-      <p:sp>
-        <p:nvSpPr>
-          <p:cNvPr id="22" name="Rectangle 21">
-            <a:extLst>
-              <a:ext uri="{FF2B5EF4-FFF2-40B4-BE49-F238E27FC236}">
-                <a16:creationId xmlns:a16="http://schemas.microsoft.com/office/drawing/2014/main" id="{B720A16E-E31F-3356-92EE-02BD8CD9C98A}"/>
+            <a:r>
+              <a:rPr lang="en-US" sz="4400" b="1" dirty="0"/>
+              <a:t>A</a:t>
+            </a:r>
+          </a:p>
+        </p:txBody>
+      </p:sp>
+      <p:sp>
+        <p:nvSpPr>
+          <p:cNvPr id="61" name="Rectangle 60">
+            <a:extLst>
+              <a:ext uri="{FF2B5EF4-FFF2-40B4-BE49-F238E27FC236}">
+                <a16:creationId xmlns:a16="http://schemas.microsoft.com/office/drawing/2014/main" id="{0D3DE522-F0E7-7973-A22C-0FA77D5BC463}"/>
               </a:ext>
             </a:extLst>
           </p:cNvPr>
@@ -12814,16 +14212,16 @@
         </p:nvSpPr>
         <p:spPr>
           <a:xfrm>
-            <a:off x="7760593" y="4083515"/>
+            <a:off x="1580925" y="4356910"/>
             <a:ext cx="914400" cy="914400"/>
           </a:xfrm>
           <a:prstGeom prst="rect">
             <a:avLst/>
           </a:prstGeom>
           <a:solidFill>
-            <a:schemeClr val="accent4">
-              <a:lumMod val="40000"/>
-              <a:lumOff val="60000"/>
+            <a:schemeClr val="accent1">
+              <a:lumMod val="60000"/>
+              <a:lumOff val="40000"/>
             </a:schemeClr>
           </a:solidFill>
           <a:ln w="28575">
@@ -12853,16 +14251,19 @@
           <a:lstStyle/>
           <a:p>
             <a:pPr algn="ctr"/>
-            <a:endParaRPr lang="en-US"/>
-          </a:p>
-        </p:txBody>
-      </p:sp>
-      <p:sp>
-        <p:nvSpPr>
-          <p:cNvPr id="23" name="Rectangle 22">
-            <a:extLst>
-              <a:ext uri="{FF2B5EF4-FFF2-40B4-BE49-F238E27FC236}">
-                <a16:creationId xmlns:a16="http://schemas.microsoft.com/office/drawing/2014/main" id="{58E7B698-D733-6E52-69C0-ED50B8383920}"/>
+            <a:r>
+              <a:rPr lang="en-US" sz="4400" b="1" dirty="0"/>
+              <a:t>B</a:t>
+            </a:r>
+          </a:p>
+        </p:txBody>
+      </p:sp>
+      <p:sp>
+        <p:nvSpPr>
+          <p:cNvPr id="2" name="Rectangle 1">
+            <a:extLst>
+              <a:ext uri="{FF2B5EF4-FFF2-40B4-BE49-F238E27FC236}">
+                <a16:creationId xmlns:a16="http://schemas.microsoft.com/office/drawing/2014/main" id="{5C44ED79-CF2A-7F95-D46E-0DD52C235B42}"/>
               </a:ext>
             </a:extLst>
           </p:cNvPr>
@@ -12873,16 +14274,17 @@
         </p:nvSpPr>
         <p:spPr>
           <a:xfrm>
-            <a:off x="7760593" y="3169115"/>
+            <a:off x="9287002" y="3442510"/>
             <a:ext cx="914400" cy="914400"/>
           </a:xfrm>
           <a:prstGeom prst="rect">
             <a:avLst/>
           </a:prstGeom>
           <a:solidFill>
-            <a:schemeClr val="accent4">
+            <a:schemeClr val="accent1">
               <a:lumMod val="40000"/>
               <a:lumOff val="60000"/>
+              <a:alpha val="80000"/>
             </a:schemeClr>
           </a:solidFill>
           <a:ln w="28575">
@@ -12912,14 +14314,1427 @@
           <a:lstStyle/>
           <a:p>
             <a:pPr algn="ctr"/>
-            <a:endParaRPr lang="en-US"/>
-          </a:p>
-        </p:txBody>
-      </p:sp>
+            <a:endParaRPr lang="en-US" sz="4400" b="1"/>
+          </a:p>
+        </p:txBody>
+      </p:sp>
+      <p:sp>
+        <p:nvSpPr>
+          <p:cNvPr id="3" name="Rectangle 2">
+            <a:extLst>
+              <a:ext uri="{FF2B5EF4-FFF2-40B4-BE49-F238E27FC236}">
+                <a16:creationId xmlns:a16="http://schemas.microsoft.com/office/drawing/2014/main" id="{7EB3B64A-3AB9-5C1D-0CDA-475F25F41E4F}"/>
+              </a:ext>
+            </a:extLst>
+          </p:cNvPr>
+          <p:cNvSpPr>
+            <a:spLocks noChangeAspect="1"/>
+          </p:cNvSpPr>
+          <p:nvPr/>
+        </p:nvSpPr>
+        <p:spPr>
+          <a:xfrm>
+            <a:off x="8372602" y="3442510"/>
+            <a:ext cx="914400" cy="914400"/>
+          </a:xfrm>
+          <a:prstGeom prst="rect">
+            <a:avLst/>
+          </a:prstGeom>
+          <a:solidFill>
+            <a:schemeClr val="accent1">
+              <a:lumMod val="60000"/>
+              <a:lumOff val="40000"/>
+            </a:schemeClr>
+          </a:solidFill>
+          <a:ln w="28575">
+            <a:solidFill>
+              <a:schemeClr val="bg1"/>
+            </a:solidFill>
+          </a:ln>
+        </p:spPr>
+        <p:style>
+          <a:lnRef idx="2">
+            <a:schemeClr val="accent1">
+              <a:shade val="50000"/>
+            </a:schemeClr>
+          </a:lnRef>
+          <a:fillRef idx="1">
+            <a:schemeClr val="accent1"/>
+          </a:fillRef>
+          <a:effectRef idx="0">
+            <a:schemeClr val="accent1"/>
+          </a:effectRef>
+          <a:fontRef idx="minor">
+            <a:schemeClr val="lt1"/>
+          </a:fontRef>
+        </p:style>
+        <p:txBody>
+          <a:bodyPr rtlCol="0" anchor="ctr"/>
+          <a:lstStyle/>
+          <a:p>
+            <a:pPr algn="ctr"/>
+            <a:r>
+              <a:rPr lang="en-US" sz="4400" b="1" dirty="0"/>
+              <a:t>B</a:t>
+            </a:r>
+          </a:p>
+        </p:txBody>
+      </p:sp>
+      <p:sp>
+        <p:nvSpPr>
+          <p:cNvPr id="4" name="Rectangle 3">
+            <a:extLst>
+              <a:ext uri="{FF2B5EF4-FFF2-40B4-BE49-F238E27FC236}">
+                <a16:creationId xmlns:a16="http://schemas.microsoft.com/office/drawing/2014/main" id="{FA93AC94-6E73-9643-A2F7-81FDBB900C05}"/>
+              </a:ext>
+            </a:extLst>
+          </p:cNvPr>
+          <p:cNvSpPr>
+            <a:spLocks noChangeAspect="1"/>
+          </p:cNvSpPr>
+          <p:nvPr/>
+        </p:nvSpPr>
+        <p:spPr>
+          <a:xfrm>
+            <a:off x="10200489" y="4356910"/>
+            <a:ext cx="914400" cy="914400"/>
+          </a:xfrm>
+          <a:prstGeom prst="rect">
+            <a:avLst/>
+          </a:prstGeom>
+          <a:solidFill>
+            <a:schemeClr val="accent1">
+              <a:lumMod val="20000"/>
+              <a:lumOff val="80000"/>
+              <a:alpha val="60000"/>
+            </a:schemeClr>
+          </a:solidFill>
+          <a:ln w="28575">
+            <a:solidFill>
+              <a:schemeClr val="bg1"/>
+            </a:solidFill>
+          </a:ln>
+        </p:spPr>
+        <p:style>
+          <a:lnRef idx="2">
+            <a:schemeClr val="accent1">
+              <a:shade val="50000"/>
+            </a:schemeClr>
+          </a:lnRef>
+          <a:fillRef idx="1">
+            <a:schemeClr val="accent1"/>
+          </a:fillRef>
+          <a:effectRef idx="0">
+            <a:schemeClr val="accent1"/>
+          </a:effectRef>
+          <a:fontRef idx="minor">
+            <a:schemeClr val="lt1"/>
+          </a:fontRef>
+        </p:style>
+        <p:txBody>
+          <a:bodyPr rtlCol="0" anchor="ctr"/>
+          <a:lstStyle/>
+          <a:p>
+            <a:pPr algn="ctr"/>
+            <a:endParaRPr lang="en-US" sz="4400" b="1"/>
+          </a:p>
+        </p:txBody>
+      </p:sp>
+      <p:sp>
+        <p:nvSpPr>
+          <p:cNvPr id="6" name="Rectangle 5">
+            <a:extLst>
+              <a:ext uri="{FF2B5EF4-FFF2-40B4-BE49-F238E27FC236}">
+                <a16:creationId xmlns:a16="http://schemas.microsoft.com/office/drawing/2014/main" id="{A1FD8CA5-759F-67C0-8137-2A97FDEF1C40}"/>
+              </a:ext>
+            </a:extLst>
+          </p:cNvPr>
+          <p:cNvSpPr>
+            <a:spLocks noChangeAspect="1"/>
+          </p:cNvSpPr>
+          <p:nvPr/>
+        </p:nvSpPr>
+        <p:spPr>
+          <a:xfrm>
+            <a:off x="8371689" y="4338677"/>
+            <a:ext cx="914400" cy="914400"/>
+          </a:xfrm>
+          <a:prstGeom prst="rect">
+            <a:avLst/>
+          </a:prstGeom>
+          <a:solidFill>
+            <a:schemeClr val="accent1">
+              <a:lumMod val="50000"/>
+            </a:schemeClr>
+          </a:solidFill>
+          <a:ln w="28575">
+            <a:solidFill>
+              <a:schemeClr val="bg1"/>
+            </a:solidFill>
+          </a:ln>
+        </p:spPr>
+        <p:style>
+          <a:lnRef idx="2">
+            <a:schemeClr val="accent1">
+              <a:shade val="50000"/>
+            </a:schemeClr>
+          </a:lnRef>
+          <a:fillRef idx="1">
+            <a:schemeClr val="accent1"/>
+          </a:fillRef>
+          <a:effectRef idx="0">
+            <a:schemeClr val="accent1"/>
+          </a:effectRef>
+          <a:fontRef idx="minor">
+            <a:schemeClr val="lt1"/>
+          </a:fontRef>
+        </p:style>
+        <p:txBody>
+          <a:bodyPr rtlCol="0" anchor="ctr"/>
+          <a:lstStyle/>
+          <a:p>
+            <a:pPr algn="ctr"/>
+            <a:r>
+              <a:rPr lang="en-US" sz="4400" b="1" dirty="0"/>
+              <a:t>C</a:t>
+            </a:r>
+          </a:p>
+        </p:txBody>
+      </p:sp>
+      <p:grpSp>
+        <p:nvGrpSpPr>
+          <p:cNvPr id="20" name="Group 19">
+            <a:extLst>
+              <a:ext uri="{FF2B5EF4-FFF2-40B4-BE49-F238E27FC236}">
+                <a16:creationId xmlns:a16="http://schemas.microsoft.com/office/drawing/2014/main" id="{894D8513-F463-B0AD-D2AF-87CA44EF60DA}"/>
+              </a:ext>
+            </a:extLst>
+          </p:cNvPr>
+          <p:cNvGrpSpPr/>
+          <p:nvPr/>
+        </p:nvGrpSpPr>
+        <p:grpSpPr>
+          <a:xfrm>
+            <a:off x="8693532" y="1860543"/>
+            <a:ext cx="2101340" cy="1371600"/>
+            <a:chOff x="8559035" y="1833395"/>
+            <a:chExt cx="2101340" cy="1371600"/>
+          </a:xfrm>
+        </p:grpSpPr>
+        <p:sp>
+          <p:nvSpPr>
+            <p:cNvPr id="34" name="Oval 33">
+              <a:extLst>
+                <a:ext uri="{FF2B5EF4-FFF2-40B4-BE49-F238E27FC236}">
+                  <a16:creationId xmlns:a16="http://schemas.microsoft.com/office/drawing/2014/main" id="{AB77270F-447D-5B6B-935B-855BBC9D618E}"/>
+                </a:ext>
+              </a:extLst>
+            </p:cNvPr>
+            <p:cNvSpPr>
+              <a:spLocks noChangeAspect="1"/>
+            </p:cNvSpPr>
+            <p:nvPr/>
+          </p:nvSpPr>
+          <p:spPr>
+            <a:xfrm flipH="1">
+              <a:off x="9288775" y="1833395"/>
+              <a:ext cx="1371600" cy="1371600"/>
+            </a:xfrm>
+            <a:prstGeom prst="ellipse">
+              <a:avLst/>
+            </a:prstGeom>
+            <a:solidFill>
+              <a:schemeClr val="tx2"/>
+            </a:solidFill>
+            <a:ln w="28575">
+              <a:solidFill>
+                <a:schemeClr val="tx2">
+                  <a:lumMod val="75000"/>
+                </a:schemeClr>
+              </a:solidFill>
+            </a:ln>
+          </p:spPr>
+          <p:style>
+            <a:lnRef idx="2">
+              <a:schemeClr val="accent1">
+                <a:shade val="50000"/>
+              </a:schemeClr>
+            </a:lnRef>
+            <a:fillRef idx="1">
+              <a:schemeClr val="accent1"/>
+            </a:fillRef>
+            <a:effectRef idx="0">
+              <a:schemeClr val="accent1"/>
+            </a:effectRef>
+            <a:fontRef idx="minor">
+              <a:schemeClr val="lt1"/>
+            </a:fontRef>
+          </p:style>
+          <p:txBody>
+            <a:bodyPr rtlCol="0" anchor="ctr"/>
+            <a:lstStyle/>
+            <a:p>
+              <a:pPr algn="ctr"/>
+              <a:endParaRPr lang="en-US"/>
+            </a:p>
+          </p:txBody>
+        </p:sp>
+        <p:sp>
+          <p:nvSpPr>
+            <p:cNvPr id="35" name="Oval 34">
+              <a:extLst>
+                <a:ext uri="{FF2B5EF4-FFF2-40B4-BE49-F238E27FC236}">
+                  <a16:creationId xmlns:a16="http://schemas.microsoft.com/office/drawing/2014/main" id="{16AAC62D-FAE6-CB24-153C-ADE9017EC15E}"/>
+                </a:ext>
+              </a:extLst>
+            </p:cNvPr>
+            <p:cNvSpPr>
+              <a:spLocks noChangeAspect="1"/>
+            </p:cNvSpPr>
+            <p:nvPr/>
+          </p:nvSpPr>
+          <p:spPr>
+            <a:xfrm flipH="1">
+              <a:off x="8562634" y="1833395"/>
+              <a:ext cx="1371600" cy="1371600"/>
+            </a:xfrm>
+            <a:prstGeom prst="ellipse">
+              <a:avLst/>
+            </a:prstGeom>
+            <a:solidFill>
+              <a:schemeClr val="tx2"/>
+            </a:solidFill>
+            <a:ln w="28575">
+              <a:solidFill>
+                <a:schemeClr val="tx2">
+                  <a:lumMod val="75000"/>
+                </a:schemeClr>
+              </a:solidFill>
+            </a:ln>
+          </p:spPr>
+          <p:style>
+            <a:lnRef idx="2">
+              <a:schemeClr val="accent1">
+                <a:shade val="50000"/>
+              </a:schemeClr>
+            </a:lnRef>
+            <a:fillRef idx="1">
+              <a:schemeClr val="accent1"/>
+            </a:fillRef>
+            <a:effectRef idx="0">
+              <a:schemeClr val="accent1"/>
+            </a:effectRef>
+            <a:fontRef idx="minor">
+              <a:schemeClr val="lt1"/>
+            </a:fontRef>
+          </p:style>
+          <p:txBody>
+            <a:bodyPr rtlCol="0" anchor="ctr"/>
+            <a:lstStyle/>
+            <a:p>
+              <a:pPr algn="ctr"/>
+              <a:endParaRPr lang="en-US"/>
+            </a:p>
+          </p:txBody>
+        </p:sp>
+        <p:grpSp>
+          <p:nvGrpSpPr>
+            <p:cNvPr id="17" name="Group 16">
+              <a:extLst>
+                <a:ext uri="{FF2B5EF4-FFF2-40B4-BE49-F238E27FC236}">
+                  <a16:creationId xmlns:a16="http://schemas.microsoft.com/office/drawing/2014/main" id="{271FC1F1-4B05-D3B3-8F08-673132BE7329}"/>
+                </a:ext>
+              </a:extLst>
+            </p:cNvPr>
+            <p:cNvGrpSpPr/>
+            <p:nvPr/>
+          </p:nvGrpSpPr>
+          <p:grpSpPr>
+            <a:xfrm>
+              <a:off x="9288774" y="1993569"/>
+              <a:ext cx="644520" cy="1057958"/>
+              <a:chOff x="9288774" y="1993569"/>
+              <a:chExt cx="644520" cy="1057958"/>
+            </a:xfrm>
+          </p:grpSpPr>
+          <p:grpSp>
+            <p:nvGrpSpPr>
+              <p:cNvPr id="13" name="Group 12">
+                <a:extLst>
+                  <a:ext uri="{FF2B5EF4-FFF2-40B4-BE49-F238E27FC236}">
+                    <a16:creationId xmlns:a16="http://schemas.microsoft.com/office/drawing/2014/main" id="{74C319FA-C732-831D-B7F1-030A483A4430}"/>
+                  </a:ext>
+                </a:extLst>
+              </p:cNvPr>
+              <p:cNvGrpSpPr/>
+              <p:nvPr/>
+            </p:nvGrpSpPr>
+            <p:grpSpPr>
+              <a:xfrm>
+                <a:off x="9288774" y="1993569"/>
+                <a:ext cx="644520" cy="1057958"/>
+                <a:chOff x="9288774" y="1993569"/>
+                <a:chExt cx="644520" cy="1057958"/>
+              </a:xfrm>
+            </p:grpSpPr>
+            <p:grpSp>
+              <p:nvGrpSpPr>
+                <p:cNvPr id="50" name="Group 49">
+                  <a:extLst>
+                    <a:ext uri="{FF2B5EF4-FFF2-40B4-BE49-F238E27FC236}">
+                      <a16:creationId xmlns:a16="http://schemas.microsoft.com/office/drawing/2014/main" id="{A1D63D67-A94D-5634-065A-0427192C87AE}"/>
+                    </a:ext>
+                  </a:extLst>
+                </p:cNvPr>
+                <p:cNvGrpSpPr/>
+                <p:nvPr/>
+              </p:nvGrpSpPr>
+              <p:grpSpPr>
+                <a:xfrm>
+                  <a:off x="9288774" y="1993569"/>
+                  <a:ext cx="644520" cy="1057958"/>
+                  <a:chOff x="7061347" y="388774"/>
+                  <a:chExt cx="644520" cy="1057958"/>
+                </a:xfrm>
+                <a:solidFill>
+                  <a:schemeClr val="bg1"/>
+                </a:solidFill>
+              </p:grpSpPr>
+              <p:sp>
+                <p:nvSpPr>
+                  <p:cNvPr id="36" name="Teardrop 35">
+                    <a:extLst>
+                      <a:ext uri="{FF2B5EF4-FFF2-40B4-BE49-F238E27FC236}">
+                        <a16:creationId xmlns:a16="http://schemas.microsoft.com/office/drawing/2014/main" id="{9CF2526B-5101-AF0F-239C-7AC2E75EB400}"/>
+                      </a:ext>
+                    </a:extLst>
+                  </p:cNvPr>
+                  <p:cNvSpPr/>
+                  <p:nvPr/>
+                </p:nvSpPr>
+                <p:spPr>
+                  <a:xfrm rot="19071904">
+                    <a:off x="7222552" y="388774"/>
+                    <a:ext cx="397473" cy="521356"/>
+                  </a:xfrm>
+                  <a:prstGeom prst="teardrop">
+                    <a:avLst>
+                      <a:gd name="adj" fmla="val 94780"/>
+                    </a:avLst>
+                  </a:prstGeom>
+                  <a:grpFill/>
+                  <a:ln>
+                    <a:noFill/>
+                  </a:ln>
+                </p:spPr>
+                <p:style>
+                  <a:lnRef idx="2">
+                    <a:schemeClr val="accent1">
+                      <a:shade val="50000"/>
+                    </a:schemeClr>
+                  </a:lnRef>
+                  <a:fillRef idx="1">
+                    <a:schemeClr val="accent1"/>
+                  </a:fillRef>
+                  <a:effectRef idx="0">
+                    <a:schemeClr val="accent1"/>
+                  </a:effectRef>
+                  <a:fontRef idx="minor">
+                    <a:schemeClr val="lt1"/>
+                  </a:fontRef>
+                </p:style>
+                <p:txBody>
+                  <a:bodyPr rtlCol="0" anchor="ctr"/>
+                  <a:lstStyle/>
+                  <a:p>
+                    <a:pPr algn="ctr"/>
+                    <a:endParaRPr lang="en-US"/>
+                  </a:p>
+                </p:txBody>
+              </p:sp>
+              <p:sp>
+                <p:nvSpPr>
+                  <p:cNvPr id="38" name="Teardrop 37">
+                    <a:extLst>
+                      <a:ext uri="{FF2B5EF4-FFF2-40B4-BE49-F238E27FC236}">
+                        <a16:creationId xmlns:a16="http://schemas.microsoft.com/office/drawing/2014/main" id="{150AAD49-A843-8B49-D14E-E5FB9D419BF2}"/>
+                      </a:ext>
+                    </a:extLst>
+                  </p:cNvPr>
+                  <p:cNvSpPr/>
+                  <p:nvPr/>
+                </p:nvSpPr>
+                <p:spPr>
+                  <a:xfrm rot="2528096" flipV="1">
+                    <a:off x="7222554" y="925376"/>
+                    <a:ext cx="397473" cy="521356"/>
+                  </a:xfrm>
+                  <a:prstGeom prst="teardrop">
+                    <a:avLst>
+                      <a:gd name="adj" fmla="val 94780"/>
+                    </a:avLst>
+                  </a:prstGeom>
+                  <a:grpFill/>
+                  <a:ln>
+                    <a:noFill/>
+                  </a:ln>
+                </p:spPr>
+                <p:style>
+                  <a:lnRef idx="2">
+                    <a:schemeClr val="accent1">
+                      <a:shade val="50000"/>
+                    </a:schemeClr>
+                  </a:lnRef>
+                  <a:fillRef idx="1">
+                    <a:schemeClr val="accent1"/>
+                  </a:fillRef>
+                  <a:effectRef idx="0">
+                    <a:schemeClr val="accent1"/>
+                  </a:effectRef>
+                  <a:fontRef idx="minor">
+                    <a:schemeClr val="lt1"/>
+                  </a:fontRef>
+                </p:style>
+                <p:txBody>
+                  <a:bodyPr rtlCol="0" anchor="ctr"/>
+                  <a:lstStyle/>
+                  <a:p>
+                    <a:pPr algn="ctr"/>
+                    <a:endParaRPr lang="en-US"/>
+                  </a:p>
+                </p:txBody>
+              </p:sp>
+              <p:sp>
+                <p:nvSpPr>
+                  <p:cNvPr id="40" name="Oval 39">
+                    <a:extLst>
+                      <a:ext uri="{FF2B5EF4-FFF2-40B4-BE49-F238E27FC236}">
+                        <a16:creationId xmlns:a16="http://schemas.microsoft.com/office/drawing/2014/main" id="{32894D40-EAF9-02DB-568F-3CDACA0E7FA0}"/>
+                      </a:ext>
+                    </a:extLst>
+                  </p:cNvPr>
+                  <p:cNvSpPr>
+                    <a:spLocks noChangeAspect="1"/>
+                  </p:cNvSpPr>
+                  <p:nvPr/>
+                </p:nvSpPr>
+                <p:spPr>
+                  <a:xfrm flipH="1">
+                    <a:off x="7061347" y="577696"/>
+                    <a:ext cx="644520" cy="644520"/>
+                  </a:xfrm>
+                  <a:prstGeom prst="ellipse">
+                    <a:avLst/>
+                  </a:prstGeom>
+                  <a:grpFill/>
+                  <a:ln w="28575">
+                    <a:noFill/>
+                  </a:ln>
+                </p:spPr>
+                <p:style>
+                  <a:lnRef idx="2">
+                    <a:schemeClr val="accent1">
+                      <a:shade val="50000"/>
+                    </a:schemeClr>
+                  </a:lnRef>
+                  <a:fillRef idx="1">
+                    <a:schemeClr val="accent1"/>
+                  </a:fillRef>
+                  <a:effectRef idx="0">
+                    <a:schemeClr val="accent1"/>
+                  </a:effectRef>
+                  <a:fontRef idx="minor">
+                    <a:schemeClr val="lt1"/>
+                  </a:fontRef>
+                </p:style>
+                <p:txBody>
+                  <a:bodyPr rtlCol="0" anchor="ctr"/>
+                  <a:lstStyle/>
+                  <a:p>
+                    <a:pPr algn="ctr"/>
+                    <a:endParaRPr lang="en-US"/>
+                  </a:p>
+                </p:txBody>
+              </p:sp>
+              <p:sp>
+                <p:nvSpPr>
+                  <p:cNvPr id="41" name="Oval 40">
+                    <a:extLst>
+                      <a:ext uri="{FF2B5EF4-FFF2-40B4-BE49-F238E27FC236}">
+                        <a16:creationId xmlns:a16="http://schemas.microsoft.com/office/drawing/2014/main" id="{38D37BD0-883E-2802-E4C2-A437E88FDF1B}"/>
+                      </a:ext>
+                    </a:extLst>
+                  </p:cNvPr>
+                  <p:cNvSpPr>
+                    <a:spLocks noChangeAspect="1"/>
+                  </p:cNvSpPr>
+                  <p:nvPr/>
+                </p:nvSpPr>
+                <p:spPr>
+                  <a:xfrm flipH="1">
+                    <a:off x="7155199" y="1133241"/>
+                    <a:ext cx="185311" cy="185311"/>
+                  </a:xfrm>
+                  <a:prstGeom prst="ellipse">
+                    <a:avLst/>
+                  </a:prstGeom>
+                  <a:grpFill/>
+                  <a:ln w="28575">
+                    <a:noFill/>
+                  </a:ln>
+                </p:spPr>
+                <p:style>
+                  <a:lnRef idx="2">
+                    <a:schemeClr val="accent1">
+                      <a:shade val="50000"/>
+                    </a:schemeClr>
+                  </a:lnRef>
+                  <a:fillRef idx="1">
+                    <a:schemeClr val="accent1"/>
+                  </a:fillRef>
+                  <a:effectRef idx="0">
+                    <a:schemeClr val="accent1"/>
+                  </a:effectRef>
+                  <a:fontRef idx="minor">
+                    <a:schemeClr val="lt1"/>
+                  </a:fontRef>
+                </p:style>
+                <p:txBody>
+                  <a:bodyPr rtlCol="0" anchor="ctr"/>
+                  <a:lstStyle/>
+                  <a:p>
+                    <a:pPr algn="ctr"/>
+                    <a:endParaRPr lang="en-US"/>
+                  </a:p>
+                </p:txBody>
+              </p:sp>
+              <p:sp>
+                <p:nvSpPr>
+                  <p:cNvPr id="42" name="Oval 41">
+                    <a:extLst>
+                      <a:ext uri="{FF2B5EF4-FFF2-40B4-BE49-F238E27FC236}">
+                        <a16:creationId xmlns:a16="http://schemas.microsoft.com/office/drawing/2014/main" id="{CA548502-5912-49C1-2187-92163A534945}"/>
+                      </a:ext>
+                    </a:extLst>
+                  </p:cNvPr>
+                  <p:cNvSpPr>
+                    <a:spLocks noChangeAspect="1"/>
+                  </p:cNvSpPr>
+                  <p:nvPr/>
+                </p:nvSpPr>
+                <p:spPr>
+                  <a:xfrm flipH="1">
+                    <a:off x="7118455" y="1080658"/>
+                    <a:ext cx="185311" cy="185311"/>
+                  </a:xfrm>
+                  <a:prstGeom prst="ellipse">
+                    <a:avLst/>
+                  </a:prstGeom>
+                  <a:grpFill/>
+                  <a:ln w="28575">
+                    <a:noFill/>
+                  </a:ln>
+                </p:spPr>
+                <p:style>
+                  <a:lnRef idx="2">
+                    <a:schemeClr val="accent1">
+                      <a:shade val="50000"/>
+                    </a:schemeClr>
+                  </a:lnRef>
+                  <a:fillRef idx="1">
+                    <a:schemeClr val="accent1"/>
+                  </a:fillRef>
+                  <a:effectRef idx="0">
+                    <a:schemeClr val="accent1"/>
+                  </a:effectRef>
+                  <a:fontRef idx="minor">
+                    <a:schemeClr val="lt1"/>
+                  </a:fontRef>
+                </p:style>
+                <p:txBody>
+                  <a:bodyPr rtlCol="0" anchor="ctr"/>
+                  <a:lstStyle/>
+                  <a:p>
+                    <a:pPr algn="ctr"/>
+                    <a:endParaRPr lang="en-US"/>
+                  </a:p>
+                </p:txBody>
+              </p:sp>
+              <p:sp>
+                <p:nvSpPr>
+                  <p:cNvPr id="43" name="Oval 42">
+                    <a:extLst>
+                      <a:ext uri="{FF2B5EF4-FFF2-40B4-BE49-F238E27FC236}">
+                        <a16:creationId xmlns:a16="http://schemas.microsoft.com/office/drawing/2014/main" id="{0132EA48-FFF5-3644-2938-5A4897D67E87}"/>
+                      </a:ext>
+                    </a:extLst>
+                  </p:cNvPr>
+                  <p:cNvSpPr>
+                    <a:spLocks noChangeAspect="1"/>
+                  </p:cNvSpPr>
+                  <p:nvPr/>
+                </p:nvSpPr>
+                <p:spPr>
+                  <a:xfrm flipH="1">
+                    <a:off x="7070809" y="977648"/>
+                    <a:ext cx="185311" cy="185311"/>
+                  </a:xfrm>
+                  <a:prstGeom prst="ellipse">
+                    <a:avLst/>
+                  </a:prstGeom>
+                  <a:grpFill/>
+                  <a:ln w="28575">
+                    <a:noFill/>
+                  </a:ln>
+                </p:spPr>
+                <p:style>
+                  <a:lnRef idx="2">
+                    <a:schemeClr val="accent1">
+                      <a:shade val="50000"/>
+                    </a:schemeClr>
+                  </a:lnRef>
+                  <a:fillRef idx="1">
+                    <a:schemeClr val="accent1"/>
+                  </a:fillRef>
+                  <a:effectRef idx="0">
+                    <a:schemeClr val="accent1"/>
+                  </a:effectRef>
+                  <a:fontRef idx="minor">
+                    <a:schemeClr val="lt1"/>
+                  </a:fontRef>
+                </p:style>
+                <p:txBody>
+                  <a:bodyPr rtlCol="0" anchor="ctr"/>
+                  <a:lstStyle/>
+                  <a:p>
+                    <a:pPr algn="ctr"/>
+                    <a:endParaRPr lang="en-US"/>
+                  </a:p>
+                </p:txBody>
+              </p:sp>
+              <p:sp>
+                <p:nvSpPr>
+                  <p:cNvPr id="44" name="Oval 43">
+                    <a:extLst>
+                      <a:ext uri="{FF2B5EF4-FFF2-40B4-BE49-F238E27FC236}">
+                        <a16:creationId xmlns:a16="http://schemas.microsoft.com/office/drawing/2014/main" id="{95777FA2-F157-18F1-5679-33C18A9747C2}"/>
+                      </a:ext>
+                    </a:extLst>
+                  </p:cNvPr>
+                  <p:cNvSpPr>
+                    <a:spLocks noChangeAspect="1"/>
+                  </p:cNvSpPr>
+                  <p:nvPr/>
+                </p:nvSpPr>
+                <p:spPr>
+                  <a:xfrm flipH="1">
+                    <a:off x="7508163" y="988002"/>
+                    <a:ext cx="185311" cy="185311"/>
+                  </a:xfrm>
+                  <a:prstGeom prst="ellipse">
+                    <a:avLst/>
+                  </a:prstGeom>
+                  <a:grpFill/>
+                  <a:ln w="28575">
+                    <a:noFill/>
+                  </a:ln>
+                </p:spPr>
+                <p:style>
+                  <a:lnRef idx="2">
+                    <a:schemeClr val="accent1">
+                      <a:shade val="50000"/>
+                    </a:schemeClr>
+                  </a:lnRef>
+                  <a:fillRef idx="1">
+                    <a:schemeClr val="accent1"/>
+                  </a:fillRef>
+                  <a:effectRef idx="0">
+                    <a:schemeClr val="accent1"/>
+                  </a:effectRef>
+                  <a:fontRef idx="minor">
+                    <a:schemeClr val="lt1"/>
+                  </a:fontRef>
+                </p:style>
+                <p:txBody>
+                  <a:bodyPr rtlCol="0" anchor="ctr"/>
+                  <a:lstStyle/>
+                  <a:p>
+                    <a:pPr algn="ctr"/>
+                    <a:endParaRPr lang="en-US"/>
+                  </a:p>
+                </p:txBody>
+              </p:sp>
+              <p:sp>
+                <p:nvSpPr>
+                  <p:cNvPr id="45" name="Oval 44">
+                    <a:extLst>
+                      <a:ext uri="{FF2B5EF4-FFF2-40B4-BE49-F238E27FC236}">
+                        <a16:creationId xmlns:a16="http://schemas.microsoft.com/office/drawing/2014/main" id="{BD582062-8F6F-5E13-14CA-4AE93FC678B4}"/>
+                      </a:ext>
+                    </a:extLst>
+                  </p:cNvPr>
+                  <p:cNvSpPr>
+                    <a:spLocks noChangeAspect="1"/>
+                  </p:cNvSpPr>
+                  <p:nvPr/>
+                </p:nvSpPr>
+                <p:spPr>
+                  <a:xfrm flipH="1">
+                    <a:off x="7519552" y="895346"/>
+                    <a:ext cx="185311" cy="185311"/>
+                  </a:xfrm>
+                  <a:prstGeom prst="ellipse">
+                    <a:avLst/>
+                  </a:prstGeom>
+                  <a:grpFill/>
+                  <a:ln w="28575">
+                    <a:noFill/>
+                  </a:ln>
+                </p:spPr>
+                <p:style>
+                  <a:lnRef idx="2">
+                    <a:schemeClr val="accent1">
+                      <a:shade val="50000"/>
+                    </a:schemeClr>
+                  </a:lnRef>
+                  <a:fillRef idx="1">
+                    <a:schemeClr val="accent1"/>
+                  </a:fillRef>
+                  <a:effectRef idx="0">
+                    <a:schemeClr val="accent1"/>
+                  </a:effectRef>
+                  <a:fontRef idx="minor">
+                    <a:schemeClr val="lt1"/>
+                  </a:fontRef>
+                </p:style>
+                <p:txBody>
+                  <a:bodyPr rtlCol="0" anchor="ctr"/>
+                  <a:lstStyle/>
+                  <a:p>
+                    <a:pPr algn="ctr"/>
+                    <a:endParaRPr lang="en-US"/>
+                  </a:p>
+                </p:txBody>
+              </p:sp>
+              <p:sp>
+                <p:nvSpPr>
+                  <p:cNvPr id="46" name="Oval 45">
+                    <a:extLst>
+                      <a:ext uri="{FF2B5EF4-FFF2-40B4-BE49-F238E27FC236}">
+                        <a16:creationId xmlns:a16="http://schemas.microsoft.com/office/drawing/2014/main" id="{8811E997-6EB3-186E-F436-E73056CCF2EB}"/>
+                      </a:ext>
+                    </a:extLst>
+                  </p:cNvPr>
+                  <p:cNvSpPr>
+                    <a:spLocks noChangeAspect="1"/>
+                  </p:cNvSpPr>
+                  <p:nvPr/>
+                </p:nvSpPr>
+                <p:spPr>
+                  <a:xfrm flipH="1">
+                    <a:off x="7505268" y="656138"/>
+                    <a:ext cx="185311" cy="185311"/>
+                  </a:xfrm>
+                  <a:prstGeom prst="ellipse">
+                    <a:avLst/>
+                  </a:prstGeom>
+                  <a:grpFill/>
+                  <a:ln w="28575">
+                    <a:noFill/>
+                  </a:ln>
+                </p:spPr>
+                <p:style>
+                  <a:lnRef idx="2">
+                    <a:schemeClr val="accent1">
+                      <a:shade val="50000"/>
+                    </a:schemeClr>
+                  </a:lnRef>
+                  <a:fillRef idx="1">
+                    <a:schemeClr val="accent1"/>
+                  </a:fillRef>
+                  <a:effectRef idx="0">
+                    <a:schemeClr val="accent1"/>
+                  </a:effectRef>
+                  <a:fontRef idx="minor">
+                    <a:schemeClr val="lt1"/>
+                  </a:fontRef>
+                </p:style>
+                <p:txBody>
+                  <a:bodyPr rtlCol="0" anchor="ctr"/>
+                  <a:lstStyle/>
+                  <a:p>
+                    <a:pPr algn="ctr"/>
+                    <a:endParaRPr lang="en-US"/>
+                  </a:p>
+                </p:txBody>
+              </p:sp>
+              <p:sp>
+                <p:nvSpPr>
+                  <p:cNvPr id="47" name="Oval 46">
+                    <a:extLst>
+                      <a:ext uri="{FF2B5EF4-FFF2-40B4-BE49-F238E27FC236}">
+                        <a16:creationId xmlns:a16="http://schemas.microsoft.com/office/drawing/2014/main" id="{81E345FC-CDBF-D2A4-F15D-61CF423CF113}"/>
+                      </a:ext>
+                    </a:extLst>
+                  </p:cNvPr>
+                  <p:cNvSpPr>
+                    <a:spLocks noChangeAspect="1"/>
+                  </p:cNvSpPr>
+                  <p:nvPr/>
+                </p:nvSpPr>
+                <p:spPr>
+                  <a:xfrm flipH="1">
+                    <a:off x="7082992" y="647398"/>
+                    <a:ext cx="185311" cy="185311"/>
+                  </a:xfrm>
+                  <a:prstGeom prst="ellipse">
+                    <a:avLst/>
+                  </a:prstGeom>
+                  <a:grpFill/>
+                  <a:ln w="28575">
+                    <a:noFill/>
+                  </a:ln>
+                </p:spPr>
+                <p:style>
+                  <a:lnRef idx="2">
+                    <a:schemeClr val="accent1">
+                      <a:shade val="50000"/>
+                    </a:schemeClr>
+                  </a:lnRef>
+                  <a:fillRef idx="1">
+                    <a:schemeClr val="accent1"/>
+                  </a:fillRef>
+                  <a:effectRef idx="0">
+                    <a:schemeClr val="accent1"/>
+                  </a:effectRef>
+                  <a:fontRef idx="minor">
+                    <a:schemeClr val="lt1"/>
+                  </a:fontRef>
+                </p:style>
+                <p:txBody>
+                  <a:bodyPr rtlCol="0" anchor="ctr"/>
+                  <a:lstStyle/>
+                  <a:p>
+                    <a:pPr algn="ctr"/>
+                    <a:endParaRPr lang="en-US"/>
+                  </a:p>
+                </p:txBody>
+              </p:sp>
+              <p:sp>
+                <p:nvSpPr>
+                  <p:cNvPr id="48" name="Oval 47">
+                    <a:extLst>
+                      <a:ext uri="{FF2B5EF4-FFF2-40B4-BE49-F238E27FC236}">
+                        <a16:creationId xmlns:a16="http://schemas.microsoft.com/office/drawing/2014/main" id="{2F8AF36B-5CC7-FFA8-1B8B-F9AB29D2A5D3}"/>
+                      </a:ext>
+                    </a:extLst>
+                  </p:cNvPr>
+                  <p:cNvSpPr>
+                    <a:spLocks noChangeAspect="1"/>
+                  </p:cNvSpPr>
+                  <p:nvPr/>
+                </p:nvSpPr>
+                <p:spPr>
+                  <a:xfrm flipH="1">
+                    <a:off x="7145931" y="510989"/>
+                    <a:ext cx="185311" cy="185311"/>
+                  </a:xfrm>
+                  <a:prstGeom prst="ellipse">
+                    <a:avLst/>
+                  </a:prstGeom>
+                  <a:grpFill/>
+                  <a:ln w="28575">
+                    <a:noFill/>
+                  </a:ln>
+                </p:spPr>
+                <p:style>
+                  <a:lnRef idx="2">
+                    <a:schemeClr val="accent1">
+                      <a:shade val="50000"/>
+                    </a:schemeClr>
+                  </a:lnRef>
+                  <a:fillRef idx="1">
+                    <a:schemeClr val="accent1"/>
+                  </a:fillRef>
+                  <a:effectRef idx="0">
+                    <a:schemeClr val="accent1"/>
+                  </a:effectRef>
+                  <a:fontRef idx="minor">
+                    <a:schemeClr val="lt1"/>
+                  </a:fontRef>
+                </p:style>
+                <p:txBody>
+                  <a:bodyPr rtlCol="0" anchor="ctr"/>
+                  <a:lstStyle/>
+                  <a:p>
+                    <a:pPr algn="ctr"/>
+                    <a:endParaRPr lang="en-US"/>
+                  </a:p>
+                </p:txBody>
+              </p:sp>
+              <p:sp>
+                <p:nvSpPr>
+                  <p:cNvPr id="49" name="Oval 48">
+                    <a:extLst>
+                      <a:ext uri="{FF2B5EF4-FFF2-40B4-BE49-F238E27FC236}">
+                        <a16:creationId xmlns:a16="http://schemas.microsoft.com/office/drawing/2014/main" id="{B864FC6A-A831-CD32-DC4B-69873A6A0C03}"/>
+                      </a:ext>
+                    </a:extLst>
+                  </p:cNvPr>
+                  <p:cNvSpPr>
+                    <a:spLocks noChangeAspect="1"/>
+                  </p:cNvSpPr>
+                  <p:nvPr/>
+                </p:nvSpPr>
+                <p:spPr>
+                  <a:xfrm flipH="1">
+                    <a:off x="7114461" y="594815"/>
+                    <a:ext cx="185311" cy="185311"/>
+                  </a:xfrm>
+                  <a:prstGeom prst="ellipse">
+                    <a:avLst/>
+                  </a:prstGeom>
+                  <a:grpFill/>
+                  <a:ln w="28575">
+                    <a:noFill/>
+                  </a:ln>
+                </p:spPr>
+                <p:style>
+                  <a:lnRef idx="2">
+                    <a:schemeClr val="accent1">
+                      <a:shade val="50000"/>
+                    </a:schemeClr>
+                  </a:lnRef>
+                  <a:fillRef idx="1">
+                    <a:schemeClr val="accent1"/>
+                  </a:fillRef>
+                  <a:effectRef idx="0">
+                    <a:schemeClr val="accent1"/>
+                  </a:effectRef>
+                  <a:fontRef idx="minor">
+                    <a:schemeClr val="lt1"/>
+                  </a:fontRef>
+                </p:style>
+                <p:txBody>
+                  <a:bodyPr rtlCol="0" anchor="ctr"/>
+                  <a:lstStyle/>
+                  <a:p>
+                    <a:pPr algn="ctr"/>
+                    <a:endParaRPr lang="en-US"/>
+                  </a:p>
+                </p:txBody>
+              </p:sp>
+            </p:grpSp>
+            <p:sp>
+              <p:nvSpPr>
+                <p:cNvPr id="11" name="Oval 10">
+                  <a:extLst>
+                    <a:ext uri="{FF2B5EF4-FFF2-40B4-BE49-F238E27FC236}">
+                      <a16:creationId xmlns:a16="http://schemas.microsoft.com/office/drawing/2014/main" id="{EF005FDE-84CB-0EE9-8A07-64893E41AEF6}"/>
+                    </a:ext>
+                  </a:extLst>
+                </p:cNvPr>
+                <p:cNvSpPr>
+                  <a:spLocks noChangeAspect="1"/>
+                </p:cNvSpPr>
+                <p:nvPr/>
+              </p:nvSpPr>
+              <p:spPr>
+                <a:xfrm flipH="1">
+                  <a:off x="9334980" y="2630611"/>
+                  <a:ext cx="185311" cy="185311"/>
+                </a:xfrm>
+                <a:prstGeom prst="ellipse">
+                  <a:avLst/>
+                </a:prstGeom>
+                <a:solidFill>
+                  <a:schemeClr val="bg1"/>
+                </a:solidFill>
+                <a:ln w="28575">
+                  <a:noFill/>
+                </a:ln>
+              </p:spPr>
+              <p:style>
+                <a:lnRef idx="2">
+                  <a:schemeClr val="accent1">
+                    <a:shade val="50000"/>
+                  </a:schemeClr>
+                </a:lnRef>
+                <a:fillRef idx="1">
+                  <a:schemeClr val="accent1"/>
+                </a:fillRef>
+                <a:effectRef idx="0">
+                  <a:schemeClr val="accent1"/>
+                </a:effectRef>
+                <a:fontRef idx="minor">
+                  <a:schemeClr val="lt1"/>
+                </a:fontRef>
+              </p:style>
+              <p:txBody>
+                <a:bodyPr rtlCol="0" anchor="ctr"/>
+                <a:lstStyle/>
+                <a:p>
+                  <a:pPr algn="ctr"/>
+                  <a:endParaRPr lang="en-US"/>
+                </a:p>
+              </p:txBody>
+            </p:sp>
+            <p:sp>
+              <p:nvSpPr>
+                <p:cNvPr id="12" name="Oval 11">
+                  <a:extLst>
+                    <a:ext uri="{FF2B5EF4-FFF2-40B4-BE49-F238E27FC236}">
+                      <a16:creationId xmlns:a16="http://schemas.microsoft.com/office/drawing/2014/main" id="{E393CFFF-3BF3-E6B8-331D-6A933E51A238}"/>
+                    </a:ext>
+                  </a:extLst>
+                </p:cNvPr>
+                <p:cNvSpPr>
+                  <a:spLocks noChangeAspect="1"/>
+                </p:cNvSpPr>
+                <p:nvPr/>
+              </p:nvSpPr>
+              <p:spPr>
+                <a:xfrm flipH="1">
+                  <a:off x="9305434" y="2519416"/>
+                  <a:ext cx="185311" cy="185311"/>
+                </a:xfrm>
+                <a:prstGeom prst="ellipse">
+                  <a:avLst/>
+                </a:prstGeom>
+                <a:solidFill>
+                  <a:schemeClr val="bg1"/>
+                </a:solidFill>
+                <a:ln w="28575">
+                  <a:noFill/>
+                </a:ln>
+              </p:spPr>
+              <p:style>
+                <a:lnRef idx="2">
+                  <a:schemeClr val="accent1">
+                    <a:shade val="50000"/>
+                  </a:schemeClr>
+                </a:lnRef>
+                <a:fillRef idx="1">
+                  <a:schemeClr val="accent1"/>
+                </a:fillRef>
+                <a:effectRef idx="0">
+                  <a:schemeClr val="accent1"/>
+                </a:effectRef>
+                <a:fontRef idx="minor">
+                  <a:schemeClr val="lt1"/>
+                </a:fontRef>
+              </p:style>
+              <p:txBody>
+                <a:bodyPr rtlCol="0" anchor="ctr"/>
+                <a:lstStyle/>
+                <a:p>
+                  <a:pPr algn="ctr"/>
+                  <a:endParaRPr lang="en-US"/>
+                </a:p>
+              </p:txBody>
+            </p:sp>
+          </p:grpSp>
+          <p:sp>
+            <p:nvSpPr>
+              <p:cNvPr id="14" name="Oval 13">
+                <a:extLst>
+                  <a:ext uri="{FF2B5EF4-FFF2-40B4-BE49-F238E27FC236}">
+                    <a16:creationId xmlns:a16="http://schemas.microsoft.com/office/drawing/2014/main" id="{A9E3F625-4C3B-3FD6-DDA4-250A193829B1}"/>
+                  </a:ext>
+                </a:extLst>
+              </p:cNvPr>
+              <p:cNvSpPr>
+                <a:spLocks noChangeAspect="1"/>
+              </p:cNvSpPr>
+              <p:nvPr/>
+            </p:nvSpPr>
+            <p:spPr>
+              <a:xfrm flipH="1">
+                <a:off x="9402051" y="2775186"/>
+                <a:ext cx="185311" cy="185311"/>
+              </a:xfrm>
+              <a:prstGeom prst="ellipse">
+                <a:avLst/>
+              </a:prstGeom>
+              <a:solidFill>
+                <a:schemeClr val="bg1"/>
+              </a:solidFill>
+              <a:ln w="28575">
+                <a:noFill/>
+              </a:ln>
+            </p:spPr>
+            <p:style>
+              <a:lnRef idx="2">
+                <a:schemeClr val="accent1">
+                  <a:shade val="50000"/>
+                </a:schemeClr>
+              </a:lnRef>
+              <a:fillRef idx="1">
+                <a:schemeClr val="accent1"/>
+              </a:fillRef>
+              <a:effectRef idx="0">
+                <a:schemeClr val="accent1"/>
+              </a:effectRef>
+              <a:fontRef idx="minor">
+                <a:schemeClr val="lt1"/>
+              </a:fontRef>
+            </p:style>
+            <p:txBody>
+              <a:bodyPr rtlCol="0" anchor="ctr"/>
+              <a:lstStyle/>
+              <a:p>
+                <a:pPr algn="ctr"/>
+                <a:endParaRPr lang="en-US"/>
+              </a:p>
+            </p:txBody>
+          </p:sp>
+          <p:sp>
+            <p:nvSpPr>
+              <p:cNvPr id="15" name="Oval 14">
+                <a:extLst>
+                  <a:ext uri="{FF2B5EF4-FFF2-40B4-BE49-F238E27FC236}">
+                    <a16:creationId xmlns:a16="http://schemas.microsoft.com/office/drawing/2014/main" id="{F2763B17-8E31-A5A6-6E7E-635B57539E8A}"/>
+                  </a:ext>
+                </a:extLst>
+              </p:cNvPr>
+              <p:cNvSpPr>
+                <a:spLocks noChangeAspect="1"/>
+              </p:cNvSpPr>
+              <p:nvPr/>
+            </p:nvSpPr>
+            <p:spPr>
+              <a:xfrm flipH="1">
+                <a:off x="9346938" y="2167553"/>
+                <a:ext cx="185311" cy="185311"/>
+              </a:xfrm>
+              <a:prstGeom prst="ellipse">
+                <a:avLst/>
+              </a:prstGeom>
+              <a:solidFill>
+                <a:schemeClr val="bg1"/>
+              </a:solidFill>
+              <a:ln w="28575">
+                <a:noFill/>
+              </a:ln>
+            </p:spPr>
+            <p:style>
+              <a:lnRef idx="2">
+                <a:schemeClr val="accent1">
+                  <a:shade val="50000"/>
+                </a:schemeClr>
+              </a:lnRef>
+              <a:fillRef idx="1">
+                <a:schemeClr val="accent1"/>
+              </a:fillRef>
+              <a:effectRef idx="0">
+                <a:schemeClr val="accent1"/>
+              </a:effectRef>
+              <a:fontRef idx="minor">
+                <a:schemeClr val="lt1"/>
+              </a:fontRef>
+            </p:style>
+            <p:txBody>
+              <a:bodyPr rtlCol="0" anchor="ctr"/>
+              <a:lstStyle/>
+              <a:p>
+                <a:pPr algn="ctr"/>
+                <a:endParaRPr lang="en-US"/>
+              </a:p>
+            </p:txBody>
+          </p:sp>
+          <p:sp>
+            <p:nvSpPr>
+              <p:cNvPr id="16" name="Oval 15">
+                <a:extLst>
+                  <a:ext uri="{FF2B5EF4-FFF2-40B4-BE49-F238E27FC236}">
+                    <a16:creationId xmlns:a16="http://schemas.microsoft.com/office/drawing/2014/main" id="{0187B3C6-B804-65FE-35FE-07C17A2737BA}"/>
+                  </a:ext>
+                </a:extLst>
+              </p:cNvPr>
+              <p:cNvSpPr>
+                <a:spLocks noChangeAspect="1"/>
+              </p:cNvSpPr>
+              <p:nvPr/>
+            </p:nvSpPr>
+            <p:spPr>
+              <a:xfrm flipH="1">
+                <a:off x="9404874" y="2071297"/>
+                <a:ext cx="185311" cy="185311"/>
+              </a:xfrm>
+              <a:prstGeom prst="ellipse">
+                <a:avLst/>
+              </a:prstGeom>
+              <a:solidFill>
+                <a:schemeClr val="bg1"/>
+              </a:solidFill>
+              <a:ln w="28575">
+                <a:noFill/>
+              </a:ln>
+            </p:spPr>
+            <p:style>
+              <a:lnRef idx="2">
+                <a:schemeClr val="accent1">
+                  <a:shade val="50000"/>
+                </a:schemeClr>
+              </a:lnRef>
+              <a:fillRef idx="1">
+                <a:schemeClr val="accent1"/>
+              </a:fillRef>
+              <a:effectRef idx="0">
+                <a:schemeClr val="accent1"/>
+              </a:effectRef>
+              <a:fontRef idx="minor">
+                <a:schemeClr val="lt1"/>
+              </a:fontRef>
+            </p:style>
+            <p:txBody>
+              <a:bodyPr rtlCol="0" anchor="ctr"/>
+              <a:lstStyle/>
+              <a:p>
+                <a:pPr algn="ctr"/>
+                <a:endParaRPr lang="en-US"/>
+              </a:p>
+            </p:txBody>
+          </p:sp>
+        </p:grpSp>
+        <p:grpSp>
+          <p:nvGrpSpPr>
+            <p:cNvPr id="19" name="Group 18">
+              <a:extLst>
+                <a:ext uri="{FF2B5EF4-FFF2-40B4-BE49-F238E27FC236}">
+                  <a16:creationId xmlns:a16="http://schemas.microsoft.com/office/drawing/2014/main" id="{BF949571-0EC9-F54A-1E23-AB6E30AEC3E7}"/>
+                </a:ext>
+              </a:extLst>
+            </p:cNvPr>
+            <p:cNvGrpSpPr/>
+            <p:nvPr/>
+          </p:nvGrpSpPr>
+          <p:grpSpPr>
+            <a:xfrm>
+              <a:off x="8559035" y="1833395"/>
+              <a:ext cx="2097741" cy="1371600"/>
+              <a:chOff x="8559035" y="1833395"/>
+              <a:chExt cx="2097741" cy="1371600"/>
+            </a:xfrm>
+          </p:grpSpPr>
+          <p:sp>
+            <p:nvSpPr>
+              <p:cNvPr id="10" name="Oval 9">
+                <a:extLst>
+                  <a:ext uri="{FF2B5EF4-FFF2-40B4-BE49-F238E27FC236}">
+                    <a16:creationId xmlns:a16="http://schemas.microsoft.com/office/drawing/2014/main" id="{18E1F89D-D7A4-74D4-C1ED-C194BF9AE762}"/>
+                  </a:ext>
+                </a:extLst>
+              </p:cNvPr>
+              <p:cNvSpPr>
+                <a:spLocks noChangeAspect="1"/>
+              </p:cNvSpPr>
+              <p:nvPr/>
+            </p:nvSpPr>
+            <p:spPr>
+              <a:xfrm flipH="1">
+                <a:off x="8559035" y="1833395"/>
+                <a:ext cx="1371600" cy="1371600"/>
+              </a:xfrm>
+              <a:prstGeom prst="ellipse">
+                <a:avLst/>
+              </a:prstGeom>
+              <a:noFill/>
+              <a:ln w="28575">
+                <a:solidFill>
+                  <a:schemeClr val="tx2">
+                    <a:lumMod val="75000"/>
+                  </a:schemeClr>
+                </a:solidFill>
+              </a:ln>
+            </p:spPr>
+            <p:style>
+              <a:lnRef idx="2">
+                <a:schemeClr val="accent1">
+                  <a:shade val="50000"/>
+                </a:schemeClr>
+              </a:lnRef>
+              <a:fillRef idx="1">
+                <a:schemeClr val="accent1"/>
+              </a:fillRef>
+              <a:effectRef idx="0">
+                <a:schemeClr val="accent1"/>
+              </a:effectRef>
+              <a:fontRef idx="minor">
+                <a:schemeClr val="lt1"/>
+              </a:fontRef>
+            </p:style>
+            <p:txBody>
+              <a:bodyPr rtlCol="0" anchor="ctr"/>
+              <a:lstStyle/>
+              <a:p>
+                <a:pPr algn="ctr"/>
+                <a:endParaRPr lang="en-US"/>
+              </a:p>
+            </p:txBody>
+          </p:sp>
+          <p:sp>
+            <p:nvSpPr>
+              <p:cNvPr id="9" name="Oval 8">
+                <a:extLst>
+                  <a:ext uri="{FF2B5EF4-FFF2-40B4-BE49-F238E27FC236}">
+                    <a16:creationId xmlns:a16="http://schemas.microsoft.com/office/drawing/2014/main" id="{7B53CC00-051A-8B01-58B3-06598A8BF883}"/>
+                  </a:ext>
+                </a:extLst>
+              </p:cNvPr>
+              <p:cNvSpPr>
+                <a:spLocks noChangeAspect="1"/>
+              </p:cNvSpPr>
+              <p:nvPr/>
+            </p:nvSpPr>
+            <p:spPr>
+              <a:xfrm flipH="1">
+                <a:off x="9285176" y="1833395"/>
+                <a:ext cx="1371600" cy="1371600"/>
+              </a:xfrm>
+              <a:prstGeom prst="ellipse">
+                <a:avLst/>
+              </a:prstGeom>
+              <a:noFill/>
+              <a:ln w="28575">
+                <a:solidFill>
+                  <a:schemeClr val="tx2">
+                    <a:lumMod val="75000"/>
+                  </a:schemeClr>
+                </a:solidFill>
+              </a:ln>
+            </p:spPr>
+            <p:style>
+              <a:lnRef idx="2">
+                <a:schemeClr val="accent1">
+                  <a:shade val="50000"/>
+                </a:schemeClr>
+              </a:lnRef>
+              <a:fillRef idx="1">
+                <a:schemeClr val="accent1"/>
+              </a:fillRef>
+              <a:effectRef idx="0">
+                <a:schemeClr val="accent1"/>
+              </a:effectRef>
+              <a:fontRef idx="minor">
+                <a:schemeClr val="lt1"/>
+              </a:fontRef>
+            </p:style>
+            <p:txBody>
+              <a:bodyPr rtlCol="0" anchor="ctr"/>
+              <a:lstStyle/>
+              <a:p>
+                <a:pPr algn="ctr"/>
+                <a:endParaRPr lang="en-US"/>
+              </a:p>
+            </p:txBody>
+          </p:sp>
+        </p:grpSp>
+      </p:grpSp>
     </p:spTree>
     <p:extLst>
       <p:ext uri="{BB962C8B-B14F-4D97-AF65-F5344CB8AC3E}">
-        <p14:creationId xmlns:p14="http://schemas.microsoft.com/office/powerpoint/2010/main" val="193486482"/>
+        <p14:creationId xmlns:p14="http://schemas.microsoft.com/office/powerpoint/2010/main" val="3178665392"/>
       </p:ext>
     </p:extLst>
   </p:cSld>

</xml_diff>